<commit_message>
Update marketing/presentation/Ring.pptx - Use https in the website URL.
</commit_message>
<xml_diff>
--- a/marketing/presentation/Ring.pptx
+++ b/marketing/presentation/Ring.pptx
@@ -255,7 +255,7 @@
             <a:fld id="{734F3E59-2A89-4B58-A144-DE0565CD10A3}" type="datetimeFigureOut">
               <a:rPr lang="en-US" smtClean="0"/>
               <a:pPr/>
-              <a:t>5/15/2017</a:t>
+              <a:t>11/19/2024</a:t>
             </a:fld>
             <a:endParaRPr lang="en-US"/>
           </a:p>
@@ -321,38 +321,37 @@
           <a:p>
             <a:pPr lvl="0"/>
             <a:r>
-              <a:rPr lang="en-US" smtClean="0"/>
+              <a:rPr lang="en-US"/>
               <a:t>Click to edit Master text styles</a:t>
             </a:r>
           </a:p>
           <a:p>
             <a:pPr lvl="1"/>
             <a:r>
-              <a:rPr lang="en-US" smtClean="0"/>
+              <a:rPr lang="en-US"/>
               <a:t>Second level</a:t>
             </a:r>
           </a:p>
           <a:p>
             <a:pPr lvl="2"/>
             <a:r>
-              <a:rPr lang="en-US" smtClean="0"/>
+              <a:rPr lang="en-US"/>
               <a:t>Third level</a:t>
             </a:r>
           </a:p>
           <a:p>
             <a:pPr lvl="3"/>
             <a:r>
-              <a:rPr lang="en-US" smtClean="0"/>
+              <a:rPr lang="en-US"/>
               <a:t>Fourth level</a:t>
             </a:r>
           </a:p>
           <a:p>
             <a:pPr lvl="4"/>
             <a:r>
-              <a:rPr lang="en-US" smtClean="0"/>
+              <a:rPr lang="en-US"/>
               <a:t>Fifth level</a:t>
             </a:r>
-            <a:endParaRPr lang="en-US"/>
           </a:p>
         </p:txBody>
       </p:sp>
@@ -760,9 +759,7 @@
         </p:style>
         <p:txBody>
           <a:bodyPr rtlCol="0" anchor="ctr"/>
-          <a:lstStyle>
-            <a:extLst/>
-          </a:lstStyle>
+          <a:lstStyle/>
           <a:p>
             <a:pPr algn="ctr" eaLnBrk="1" latinLnBrk="0" hangingPunct="1"/>
             <a:endParaRPr kumimoji="0" lang="en-US"/>
@@ -806,10 +803,9 @@
           </a:lstStyle>
           <a:p>
             <a:r>
-              <a:rPr kumimoji="0" lang="en-US" smtClean="0"/>
+              <a:rPr kumimoji="0" lang="en-US"/>
               <a:t>Click to edit Master title style</a:t>
             </a:r>
-            <a:endParaRPr kumimoji="0" lang="en-US"/>
           </a:p>
         </p:txBody>
       </p:sp>
@@ -924,10 +920,9 @@
           </a:lstStyle>
           <a:p>
             <a:r>
-              <a:rPr kumimoji="0" lang="en-US" smtClean="0"/>
+              <a:rPr kumimoji="0" lang="en-US"/>
               <a:t>Click to edit Master subtitle style</a:t>
             </a:r>
-            <a:endParaRPr kumimoji="0" lang="en-US"/>
           </a:p>
         </p:txBody>
       </p:sp>
@@ -949,7 +944,7 @@
             <a:fld id="{24E88B5C-CE1F-417E-9D80-6FD613872C83}" type="datetimeFigureOut">
               <a:rPr lang="en-US" smtClean="0"/>
               <a:pPr/>
-              <a:t>5/15/2017</a:t>
+              <a:t>11/19/2024</a:t>
             </a:fld>
             <a:endParaRPr lang="en-US"/>
           </a:p>
@@ -1043,9 +1038,7 @@
         </p:style>
         <p:txBody>
           <a:bodyPr rtlCol="0" anchor="ctr"/>
-          <a:lstStyle>
-            <a:extLst/>
-          </a:lstStyle>
+          <a:lstStyle/>
           <a:p>
             <a:pPr algn="ctr" eaLnBrk="1" latinLnBrk="0" hangingPunct="1"/>
             <a:endParaRPr kumimoji="0" lang="en-US"/>
@@ -1090,15 +1083,12 @@
         <p:spPr/>
         <p:txBody>
           <a:bodyPr/>
-          <a:lstStyle>
-            <a:extLst/>
-          </a:lstStyle>
-          <a:p>
-            <a:r>
-              <a:rPr kumimoji="0" lang="en-US" smtClean="0"/>
+          <a:lstStyle/>
+          <a:p>
+            <a:r>
+              <a:rPr kumimoji="0" lang="en-US"/>
               <a:t>Click to edit Master title style</a:t>
             </a:r>
-            <a:endParaRPr kumimoji="0" lang="en-US"/>
           </a:p>
         </p:txBody>
       </p:sp>
@@ -1115,41 +1105,39 @@
         <p:spPr/>
         <p:txBody>
           <a:bodyPr vert="eaVert"/>
-          <a:lstStyle>
-            <a:extLst/>
-          </a:lstStyle>
+          <a:lstStyle/>
           <a:p>
             <a:pPr lvl="0" eaLnBrk="1" latinLnBrk="0" hangingPunct="1"/>
             <a:r>
-              <a:rPr lang="en-US" smtClean="0"/>
+              <a:rPr lang="en-US"/>
               <a:t>Click to edit Master text styles</a:t>
             </a:r>
           </a:p>
           <a:p>
             <a:pPr lvl="1" eaLnBrk="1" latinLnBrk="0" hangingPunct="1"/>
             <a:r>
-              <a:rPr lang="en-US" smtClean="0"/>
+              <a:rPr lang="en-US"/>
               <a:t>Second level</a:t>
             </a:r>
           </a:p>
           <a:p>
             <a:pPr lvl="2" eaLnBrk="1" latinLnBrk="0" hangingPunct="1"/>
             <a:r>
-              <a:rPr lang="en-US" smtClean="0"/>
+              <a:rPr lang="en-US"/>
               <a:t>Third level</a:t>
             </a:r>
           </a:p>
           <a:p>
             <a:pPr lvl="3" eaLnBrk="1" latinLnBrk="0" hangingPunct="1"/>
             <a:r>
-              <a:rPr lang="en-US" smtClean="0"/>
+              <a:rPr lang="en-US"/>
               <a:t>Fourth level</a:t>
             </a:r>
           </a:p>
           <a:p>
             <a:pPr lvl="4" eaLnBrk="1" latinLnBrk="0" hangingPunct="1"/>
             <a:r>
-              <a:rPr lang="en-US" smtClean="0"/>
+              <a:rPr lang="en-US"/>
               <a:t>Fifth level</a:t>
             </a:r>
             <a:endParaRPr kumimoji="0" lang="en-US"/>
@@ -1174,7 +1162,7 @@
             <a:fld id="{24E88B5C-CE1F-417E-9D80-6FD613872C83}" type="datetimeFigureOut">
               <a:rPr lang="en-US" smtClean="0"/>
               <a:pPr/>
-              <a:t>5/15/2017</a:t>
+              <a:t>11/19/2024</a:t>
             </a:fld>
             <a:endParaRPr lang="en-US"/>
           </a:p>
@@ -1293,9 +1281,7 @@
         </p:style>
         <p:txBody>
           <a:bodyPr rtlCol="0" anchor="ctr"/>
-          <a:lstStyle>
-            <a:extLst/>
-          </a:lstStyle>
+          <a:lstStyle/>
           <a:p>
             <a:pPr algn="ctr" eaLnBrk="1" latinLnBrk="0" hangingPunct="1"/>
             <a:endParaRPr kumimoji="0" lang="en-US"/>
@@ -1340,9 +1326,7 @@
         </p:style>
         <p:txBody>
           <a:bodyPr rtlCol="0" anchor="ctr"/>
-          <a:lstStyle>
-            <a:extLst/>
-          </a:lstStyle>
+          <a:lstStyle/>
           <a:p>
             <a:pPr algn="ctr" eaLnBrk="1" latinLnBrk="0" hangingPunct="1"/>
             <a:endParaRPr kumimoji="0" lang="en-US"/>
@@ -1367,15 +1351,12 @@
         </p:spPr>
         <p:txBody>
           <a:bodyPr vert="eaVert"/>
-          <a:lstStyle>
-            <a:extLst/>
-          </a:lstStyle>
-          <a:p>
-            <a:r>
-              <a:rPr kumimoji="0" lang="en-US" smtClean="0"/>
+          <a:lstStyle/>
+          <a:p>
+            <a:r>
+              <a:rPr kumimoji="0" lang="en-US"/>
               <a:t>Click to edit Master title style</a:t>
             </a:r>
-            <a:endParaRPr kumimoji="0" lang="en-US"/>
           </a:p>
         </p:txBody>
       </p:sp>
@@ -1397,41 +1378,39 @@
         </p:spPr>
         <p:txBody>
           <a:bodyPr vert="eaVert"/>
-          <a:lstStyle>
-            <a:extLst/>
-          </a:lstStyle>
+          <a:lstStyle/>
           <a:p>
             <a:pPr lvl="0" eaLnBrk="1" latinLnBrk="0" hangingPunct="1"/>
             <a:r>
-              <a:rPr lang="en-US" smtClean="0"/>
+              <a:rPr lang="en-US"/>
               <a:t>Click to edit Master text styles</a:t>
             </a:r>
           </a:p>
           <a:p>
             <a:pPr lvl="1" eaLnBrk="1" latinLnBrk="0" hangingPunct="1"/>
             <a:r>
-              <a:rPr lang="en-US" smtClean="0"/>
+              <a:rPr lang="en-US"/>
               <a:t>Second level</a:t>
             </a:r>
           </a:p>
           <a:p>
             <a:pPr lvl="2" eaLnBrk="1" latinLnBrk="0" hangingPunct="1"/>
             <a:r>
-              <a:rPr lang="en-US" smtClean="0"/>
+              <a:rPr lang="en-US"/>
               <a:t>Third level</a:t>
             </a:r>
           </a:p>
           <a:p>
             <a:pPr lvl="3" eaLnBrk="1" latinLnBrk="0" hangingPunct="1"/>
             <a:r>
-              <a:rPr lang="en-US" smtClean="0"/>
+              <a:rPr lang="en-US"/>
               <a:t>Fourth level</a:t>
             </a:r>
           </a:p>
           <a:p>
             <a:pPr lvl="4" eaLnBrk="1" latinLnBrk="0" hangingPunct="1"/>
             <a:r>
-              <a:rPr lang="en-US" smtClean="0"/>
+              <a:rPr lang="en-US"/>
               <a:t>Fifth level</a:t>
             </a:r>
             <a:endParaRPr kumimoji="0" lang="en-US"/>
@@ -1456,7 +1435,7 @@
             <a:fld id="{24E88B5C-CE1F-417E-9D80-6FD613872C83}" type="datetimeFigureOut">
               <a:rPr lang="en-US" smtClean="0"/>
               <a:pPr/>
-              <a:t>5/15/2017</a:t>
+              <a:t>11/19/2024</a:t>
             </a:fld>
             <a:endParaRPr lang="en-US"/>
           </a:p>
@@ -1553,15 +1532,12 @@
         </p:spPr>
         <p:txBody>
           <a:bodyPr/>
-          <a:lstStyle>
-            <a:extLst/>
-          </a:lstStyle>
-          <a:p>
-            <a:r>
-              <a:rPr kumimoji="0" lang="en-US" smtClean="0"/>
+          <a:lstStyle/>
+          <a:p>
+            <a:r>
+              <a:rPr kumimoji="0" lang="en-US"/>
               <a:t>Click to edit Master title style</a:t>
             </a:r>
-            <a:endParaRPr kumimoji="0" lang="en-US"/>
           </a:p>
         </p:txBody>
       </p:sp>
@@ -1578,41 +1554,39 @@
         <p:spPr/>
         <p:txBody>
           <a:bodyPr/>
-          <a:lstStyle>
-            <a:extLst/>
-          </a:lstStyle>
+          <a:lstStyle/>
           <a:p>
             <a:pPr lvl="0" eaLnBrk="1" latinLnBrk="0" hangingPunct="1"/>
             <a:r>
-              <a:rPr lang="en-US" smtClean="0"/>
+              <a:rPr lang="en-US"/>
               <a:t>Click to edit Master text styles</a:t>
             </a:r>
           </a:p>
           <a:p>
             <a:pPr lvl="1" eaLnBrk="1" latinLnBrk="0" hangingPunct="1"/>
             <a:r>
-              <a:rPr lang="en-US" smtClean="0"/>
+              <a:rPr lang="en-US"/>
               <a:t>Second level</a:t>
             </a:r>
           </a:p>
           <a:p>
             <a:pPr lvl="2" eaLnBrk="1" latinLnBrk="0" hangingPunct="1"/>
             <a:r>
-              <a:rPr lang="en-US" smtClean="0"/>
+              <a:rPr lang="en-US"/>
               <a:t>Third level</a:t>
             </a:r>
           </a:p>
           <a:p>
             <a:pPr lvl="3" eaLnBrk="1" latinLnBrk="0" hangingPunct="1"/>
             <a:r>
-              <a:rPr lang="en-US" smtClean="0"/>
+              <a:rPr lang="en-US"/>
               <a:t>Fourth level</a:t>
             </a:r>
           </a:p>
           <a:p>
             <a:pPr lvl="4" eaLnBrk="1" latinLnBrk="0" hangingPunct="1"/>
             <a:r>
-              <a:rPr lang="en-US" smtClean="0"/>
+              <a:rPr lang="en-US"/>
               <a:t>Fifth level</a:t>
             </a:r>
             <a:endParaRPr kumimoji="0" lang="en-US"/>
@@ -1637,7 +1611,7 @@
             <a:fld id="{24E88B5C-CE1F-417E-9D80-6FD613872C83}" type="datetimeFigureOut">
               <a:rPr lang="en-US" smtClean="0"/>
               <a:pPr/>
-              <a:t>5/15/2017</a:t>
+              <a:t>11/19/2024</a:t>
             </a:fld>
             <a:endParaRPr lang="en-US"/>
           </a:p>
@@ -1754,9 +1728,7 @@
         </p:style>
         <p:txBody>
           <a:bodyPr rtlCol="0" anchor="ctr"/>
-          <a:lstStyle>
-            <a:extLst/>
-          </a:lstStyle>
+          <a:lstStyle/>
           <a:p>
             <a:pPr algn="ctr" eaLnBrk="1" latinLnBrk="0" hangingPunct="1"/>
             <a:endParaRPr kumimoji="0" lang="en-US"/>
@@ -1808,9 +1780,7 @@
         </p:style>
         <p:txBody>
           <a:bodyPr rtlCol="0" anchor="ctr"/>
-          <a:lstStyle>
-            <a:extLst/>
-          </a:lstStyle>
+          <a:lstStyle/>
           <a:p>
             <a:pPr algn="ctr" eaLnBrk="1" latinLnBrk="0" hangingPunct="1"/>
             <a:endParaRPr kumimoji="0" lang="en-US"/>
@@ -1854,10 +1824,9 @@
           </a:lstStyle>
           <a:p>
             <a:r>
-              <a:rPr kumimoji="0" lang="en-US" smtClean="0"/>
+              <a:rPr kumimoji="0" lang="en-US"/>
               <a:t>Click to edit Master title style</a:t>
             </a:r>
-            <a:endParaRPr kumimoji="0" lang="en-US"/>
           </a:p>
         </p:txBody>
       </p:sp>
@@ -1973,7 +1942,7 @@
           <a:p>
             <a:pPr lvl="0" eaLnBrk="1" latinLnBrk="0" hangingPunct="1"/>
             <a:r>
-              <a:rPr kumimoji="0" lang="en-US" smtClean="0"/>
+              <a:rPr kumimoji="0" lang="en-US"/>
               <a:t>Click to edit Master text styles</a:t>
             </a:r>
           </a:p>
@@ -1997,7 +1966,7 @@
             <a:fld id="{24E88B5C-CE1F-417E-9D80-6FD613872C83}" type="datetimeFigureOut">
               <a:rPr lang="en-US" smtClean="0"/>
               <a:pPr/>
-              <a:t>5/15/2017</a:t>
+              <a:t>11/19/2024</a:t>
             </a:fld>
             <a:endParaRPr lang="en-US"/>
           </a:p>
@@ -2084,15 +2053,12 @@
         <p:spPr/>
         <p:txBody>
           <a:bodyPr/>
-          <a:lstStyle>
-            <a:extLst/>
-          </a:lstStyle>
-          <a:p>
-            <a:r>
-              <a:rPr kumimoji="0" lang="en-US" smtClean="0"/>
+          <a:lstStyle/>
+          <a:p>
+            <a:r>
+              <a:rPr kumimoji="0" lang="en-US"/>
               <a:t>Click to edit Master title style</a:t>
             </a:r>
-            <a:endParaRPr kumimoji="0" lang="en-US"/>
           </a:p>
         </p:txBody>
       </p:sp>
@@ -2147,35 +2113,35 @@
           <a:p>
             <a:pPr lvl="0" eaLnBrk="1" latinLnBrk="0" hangingPunct="1"/>
             <a:r>
-              <a:rPr lang="en-US" smtClean="0"/>
+              <a:rPr lang="en-US"/>
               <a:t>Click to edit Master text styles</a:t>
             </a:r>
           </a:p>
           <a:p>
             <a:pPr lvl="1" eaLnBrk="1" latinLnBrk="0" hangingPunct="1"/>
             <a:r>
-              <a:rPr lang="en-US" smtClean="0"/>
+              <a:rPr lang="en-US"/>
               <a:t>Second level</a:t>
             </a:r>
           </a:p>
           <a:p>
             <a:pPr lvl="2" eaLnBrk="1" latinLnBrk="0" hangingPunct="1"/>
             <a:r>
-              <a:rPr lang="en-US" smtClean="0"/>
+              <a:rPr lang="en-US"/>
               <a:t>Third level</a:t>
             </a:r>
           </a:p>
           <a:p>
             <a:pPr lvl="3" eaLnBrk="1" latinLnBrk="0" hangingPunct="1"/>
             <a:r>
-              <a:rPr lang="en-US" smtClean="0"/>
+              <a:rPr lang="en-US"/>
               <a:t>Fourth level</a:t>
             </a:r>
           </a:p>
           <a:p>
             <a:pPr lvl="4" eaLnBrk="1" latinLnBrk="0" hangingPunct="1"/>
             <a:r>
-              <a:rPr lang="en-US" smtClean="0"/>
+              <a:rPr lang="en-US"/>
               <a:t>Fifth level</a:t>
             </a:r>
             <a:endParaRPr kumimoji="0" lang="en-US"/>
@@ -2233,35 +2199,35 @@
           <a:p>
             <a:pPr lvl="0" eaLnBrk="1" latinLnBrk="0" hangingPunct="1"/>
             <a:r>
-              <a:rPr lang="en-US" smtClean="0"/>
+              <a:rPr lang="en-US"/>
               <a:t>Click to edit Master text styles</a:t>
             </a:r>
           </a:p>
           <a:p>
             <a:pPr lvl="1" eaLnBrk="1" latinLnBrk="0" hangingPunct="1"/>
             <a:r>
-              <a:rPr lang="en-US" smtClean="0"/>
+              <a:rPr lang="en-US"/>
               <a:t>Second level</a:t>
             </a:r>
           </a:p>
           <a:p>
             <a:pPr lvl="2" eaLnBrk="1" latinLnBrk="0" hangingPunct="1"/>
             <a:r>
-              <a:rPr lang="en-US" smtClean="0"/>
+              <a:rPr lang="en-US"/>
               <a:t>Third level</a:t>
             </a:r>
           </a:p>
           <a:p>
             <a:pPr lvl="3" eaLnBrk="1" latinLnBrk="0" hangingPunct="1"/>
             <a:r>
-              <a:rPr lang="en-US" smtClean="0"/>
+              <a:rPr lang="en-US"/>
               <a:t>Fourth level</a:t>
             </a:r>
           </a:p>
           <a:p>
             <a:pPr lvl="4" eaLnBrk="1" latinLnBrk="0" hangingPunct="1"/>
             <a:r>
-              <a:rPr lang="en-US" smtClean="0"/>
+              <a:rPr lang="en-US"/>
               <a:t>Fifth level</a:t>
             </a:r>
             <a:endParaRPr kumimoji="0" lang="en-US"/>
@@ -2286,7 +2252,7 @@
             <a:fld id="{24E88B5C-CE1F-417E-9D80-6FD613872C83}" type="datetimeFigureOut">
               <a:rPr lang="en-US" smtClean="0"/>
               <a:pPr/>
-              <a:t>5/15/2017</a:t>
+              <a:t>11/19/2024</a:t>
             </a:fld>
             <a:endParaRPr lang="en-US"/>
           </a:p>
@@ -2381,10 +2347,9 @@
           </a:lstStyle>
           <a:p>
             <a:r>
-              <a:rPr kumimoji="0" lang="en-US" smtClean="0"/>
+              <a:rPr kumimoji="0" lang="en-US"/>
               <a:t>Click to edit Master title style</a:t>
             </a:r>
-            <a:endParaRPr kumimoji="0" lang="en-US"/>
           </a:p>
         </p:txBody>
       </p:sp>
@@ -2448,7 +2413,7 @@
           <a:p>
             <a:pPr lvl="0" eaLnBrk="1" latinLnBrk="0" hangingPunct="1"/>
             <a:r>
-              <a:rPr kumimoji="0" lang="en-US" smtClean="0"/>
+              <a:rPr kumimoji="0" lang="en-US"/>
               <a:t>Click to edit Master text styles</a:t>
             </a:r>
           </a:p>
@@ -2505,35 +2470,35 @@
           <a:p>
             <a:pPr lvl="0" eaLnBrk="1" latinLnBrk="0" hangingPunct="1"/>
             <a:r>
-              <a:rPr lang="en-US" smtClean="0"/>
+              <a:rPr lang="en-US"/>
               <a:t>Click to edit Master text styles</a:t>
             </a:r>
           </a:p>
           <a:p>
             <a:pPr lvl="1" eaLnBrk="1" latinLnBrk="0" hangingPunct="1"/>
             <a:r>
-              <a:rPr lang="en-US" smtClean="0"/>
+              <a:rPr lang="en-US"/>
               <a:t>Second level</a:t>
             </a:r>
           </a:p>
           <a:p>
             <a:pPr lvl="2" eaLnBrk="1" latinLnBrk="0" hangingPunct="1"/>
             <a:r>
-              <a:rPr lang="en-US" smtClean="0"/>
+              <a:rPr lang="en-US"/>
               <a:t>Third level</a:t>
             </a:r>
           </a:p>
           <a:p>
             <a:pPr lvl="3" eaLnBrk="1" latinLnBrk="0" hangingPunct="1"/>
             <a:r>
-              <a:rPr lang="en-US" smtClean="0"/>
+              <a:rPr lang="en-US"/>
               <a:t>Fourth level</a:t>
             </a:r>
           </a:p>
           <a:p>
             <a:pPr lvl="4" eaLnBrk="1" latinLnBrk="0" hangingPunct="1"/>
             <a:r>
-              <a:rPr lang="en-US" smtClean="0"/>
+              <a:rPr lang="en-US"/>
               <a:t>Fifth level</a:t>
             </a:r>
             <a:endParaRPr kumimoji="0" lang="en-US"/>
@@ -2600,7 +2565,7 @@
           <a:p>
             <a:pPr lvl="0" eaLnBrk="1" latinLnBrk="0" hangingPunct="1"/>
             <a:r>
-              <a:rPr kumimoji="0" lang="en-US" smtClean="0"/>
+              <a:rPr kumimoji="0" lang="en-US"/>
               <a:t>Click to edit Master text styles</a:t>
             </a:r>
           </a:p>
@@ -2657,35 +2622,35 @@
           <a:p>
             <a:pPr lvl="0" eaLnBrk="1" latinLnBrk="0" hangingPunct="1"/>
             <a:r>
-              <a:rPr lang="en-US" smtClean="0"/>
+              <a:rPr lang="en-US"/>
               <a:t>Click to edit Master text styles</a:t>
             </a:r>
           </a:p>
           <a:p>
             <a:pPr lvl="1" eaLnBrk="1" latinLnBrk="0" hangingPunct="1"/>
             <a:r>
-              <a:rPr lang="en-US" smtClean="0"/>
+              <a:rPr lang="en-US"/>
               <a:t>Second level</a:t>
             </a:r>
           </a:p>
           <a:p>
             <a:pPr lvl="2" eaLnBrk="1" latinLnBrk="0" hangingPunct="1"/>
             <a:r>
-              <a:rPr lang="en-US" smtClean="0"/>
+              <a:rPr lang="en-US"/>
               <a:t>Third level</a:t>
             </a:r>
           </a:p>
           <a:p>
             <a:pPr lvl="3" eaLnBrk="1" latinLnBrk="0" hangingPunct="1"/>
             <a:r>
-              <a:rPr lang="en-US" smtClean="0"/>
+              <a:rPr lang="en-US"/>
               <a:t>Fourth level</a:t>
             </a:r>
           </a:p>
           <a:p>
             <a:pPr lvl="4" eaLnBrk="1" latinLnBrk="0" hangingPunct="1"/>
             <a:r>
-              <a:rPr lang="en-US" smtClean="0"/>
+              <a:rPr lang="en-US"/>
               <a:t>Fifth level</a:t>
             </a:r>
             <a:endParaRPr kumimoji="0" lang="en-US"/>
@@ -2710,7 +2675,7 @@
             <a:fld id="{24E88B5C-CE1F-417E-9D80-6FD613872C83}" type="datetimeFigureOut">
               <a:rPr lang="en-US" smtClean="0"/>
               <a:pPr/>
-              <a:t>5/15/2017</a:t>
+              <a:t>11/19/2024</a:t>
             </a:fld>
             <a:endParaRPr lang="en-US"/>
           </a:p>
@@ -2797,15 +2762,12 @@
         <p:spPr/>
         <p:txBody>
           <a:bodyPr/>
-          <a:lstStyle>
-            <a:extLst/>
-          </a:lstStyle>
-          <a:p>
-            <a:r>
-              <a:rPr kumimoji="0" lang="en-US" smtClean="0"/>
+          <a:lstStyle/>
+          <a:p>
+            <a:r>
+              <a:rPr kumimoji="0" lang="en-US"/>
               <a:t>Click to edit Master title style</a:t>
             </a:r>
-            <a:endParaRPr kumimoji="0" lang="en-US"/>
           </a:p>
         </p:txBody>
       </p:sp>
@@ -2827,7 +2789,7 @@
             <a:fld id="{24E88B5C-CE1F-417E-9D80-6FD613872C83}" type="datetimeFigureOut">
               <a:rPr lang="en-US" smtClean="0"/>
               <a:pPr/>
-              <a:t>5/15/2017</a:t>
+              <a:t>11/19/2024</a:t>
             </a:fld>
             <a:endParaRPr lang="en-US"/>
           </a:p>
@@ -2919,7 +2881,7 @@
             <a:fld id="{24E88B5C-CE1F-417E-9D80-6FD613872C83}" type="datetimeFigureOut">
               <a:rPr lang="en-US" smtClean="0"/>
               <a:pPr/>
-              <a:t>5/15/2017</a:t>
+              <a:t>11/19/2024</a:t>
             </a:fld>
             <a:endParaRPr lang="en-US"/>
           </a:p>
@@ -3022,10 +2984,9 @@
           </a:lstStyle>
           <a:p>
             <a:r>
-              <a:rPr kumimoji="0" lang="en-US" smtClean="0"/>
+              <a:rPr kumimoji="0" lang="en-US"/>
               <a:t>Click to edit Master title style</a:t>
             </a:r>
-            <a:endParaRPr kumimoji="0" lang="en-US"/>
           </a:p>
         </p:txBody>
       </p:sp>
@@ -3080,35 +3041,35 @@
           <a:p>
             <a:pPr lvl="0" eaLnBrk="1" latinLnBrk="0" hangingPunct="1"/>
             <a:r>
-              <a:rPr lang="en-US" smtClean="0"/>
+              <a:rPr lang="en-US"/>
               <a:t>Click to edit Master text styles</a:t>
             </a:r>
           </a:p>
           <a:p>
             <a:pPr lvl="1" eaLnBrk="1" latinLnBrk="0" hangingPunct="1"/>
             <a:r>
-              <a:rPr lang="en-US" smtClean="0"/>
+              <a:rPr lang="en-US"/>
               <a:t>Second level</a:t>
             </a:r>
           </a:p>
           <a:p>
             <a:pPr lvl="2" eaLnBrk="1" latinLnBrk="0" hangingPunct="1"/>
             <a:r>
-              <a:rPr lang="en-US" smtClean="0"/>
+              <a:rPr lang="en-US"/>
               <a:t>Third level</a:t>
             </a:r>
           </a:p>
           <a:p>
             <a:pPr lvl="3" eaLnBrk="1" latinLnBrk="0" hangingPunct="1"/>
             <a:r>
-              <a:rPr lang="en-US" smtClean="0"/>
+              <a:rPr lang="en-US"/>
               <a:t>Fourth level</a:t>
             </a:r>
           </a:p>
           <a:p>
             <a:pPr lvl="4" eaLnBrk="1" latinLnBrk="0" hangingPunct="1"/>
             <a:r>
-              <a:rPr lang="en-US" smtClean="0"/>
+              <a:rPr lang="en-US"/>
               <a:t>Fifth level</a:t>
             </a:r>
             <a:endParaRPr kumimoji="0" lang="en-US"/>
@@ -3175,7 +3136,7 @@
           <a:p>
             <a:pPr lvl="0" eaLnBrk="1" latinLnBrk="0" hangingPunct="1"/>
             <a:r>
-              <a:rPr kumimoji="0" lang="en-US" smtClean="0"/>
+              <a:rPr kumimoji="0" lang="en-US"/>
               <a:t>Click to edit Master text styles</a:t>
             </a:r>
           </a:p>
@@ -3199,7 +3160,7 @@
             <a:fld id="{24E88B5C-CE1F-417E-9D80-6FD613872C83}" type="datetimeFigureOut">
               <a:rPr lang="en-US" smtClean="0"/>
               <a:pPr/>
-              <a:t>5/15/2017</a:t>
+              <a:t>11/19/2024</a:t>
             </a:fld>
             <a:endParaRPr lang="en-US"/>
           </a:p>
@@ -3286,9 +3247,7 @@
         </p:style>
         <p:txBody>
           <a:bodyPr rtlCol="0" anchor="ctr"/>
-          <a:lstStyle>
-            <a:extLst/>
-          </a:lstStyle>
+          <a:lstStyle/>
           <a:p>
             <a:pPr algn="ctr" eaLnBrk="1" latinLnBrk="0" hangingPunct="1"/>
             <a:endParaRPr kumimoji="0" lang="en-US"/>
@@ -3333,9 +3292,7 @@
         </p:style>
         <p:txBody>
           <a:bodyPr rtlCol="0" anchor="ctr"/>
-          <a:lstStyle>
-            <a:extLst/>
-          </a:lstStyle>
+          <a:lstStyle/>
           <a:p>
             <a:pPr algn="ctr" eaLnBrk="1" latinLnBrk="0" hangingPunct="1"/>
             <a:endParaRPr kumimoji="0" lang="en-US"/>
@@ -3400,10 +3357,9 @@
           </a:lstStyle>
           <a:p>
             <a:r>
-              <a:rPr kumimoji="0" lang="en-US" smtClean="0"/>
+              <a:rPr kumimoji="0" lang="en-US"/>
               <a:t>Click to edit Master title style</a:t>
             </a:r>
-            <a:endParaRPr kumimoji="0" lang="en-US"/>
           </a:p>
         </p:txBody>
       </p:sp>
@@ -3471,7 +3427,7 @@
           </a:lstStyle>
           <a:p>
             <a:r>
-              <a:rPr kumimoji="0" lang="en-US" smtClean="0"/>
+              <a:rPr kumimoji="0" lang="en-US"/>
               <a:t>Click icon to add picture</a:t>
             </a:r>
             <a:endParaRPr kumimoji="0" lang="en-US" dirty="0"/>
@@ -3538,7 +3494,7 @@
           <a:p>
             <a:pPr lvl="0" eaLnBrk="1" latinLnBrk="0" hangingPunct="1"/>
             <a:r>
-              <a:rPr kumimoji="0" lang="en-US" smtClean="0"/>
+              <a:rPr kumimoji="0" lang="en-US"/>
               <a:t>Click to edit Master text styles</a:t>
             </a:r>
           </a:p>
@@ -3567,7 +3523,7 @@
             <a:fld id="{24E88B5C-CE1F-417E-9D80-6FD613872C83}" type="datetimeFigureOut">
               <a:rPr lang="en-US" smtClean="0"/>
               <a:pPr/>
-              <a:t>5/15/2017</a:t>
+              <a:t>11/19/2024</a:t>
             </a:fld>
             <a:endParaRPr lang="en-US"/>
           </a:p>
@@ -3611,9 +3567,7 @@
         </p:style>
         <p:txBody>
           <a:bodyPr rtlCol="0" anchor="ctr"/>
-          <a:lstStyle>
-            <a:extLst/>
-          </a:lstStyle>
+          <a:lstStyle/>
           <a:p>
             <a:pPr algn="ctr" eaLnBrk="1" latinLnBrk="0" hangingPunct="1"/>
             <a:endParaRPr kumimoji="0" lang="en-US"/>
@@ -3658,9 +3612,7 @@
         </p:style>
         <p:txBody>
           <a:bodyPr rtlCol="0" anchor="ctr"/>
-          <a:lstStyle>
-            <a:extLst/>
-          </a:lstStyle>
+          <a:lstStyle/>
           <a:p>
             <a:pPr algn="ctr" eaLnBrk="1" latinLnBrk="0" hangingPunct="1"/>
             <a:endParaRPr kumimoji="0" lang="en-US"/>
@@ -3805,9 +3757,7 @@
         </p:style>
         <p:txBody>
           <a:bodyPr rtlCol="0" anchor="ctr"/>
-          <a:lstStyle>
-            <a:extLst/>
-          </a:lstStyle>
+          <a:lstStyle/>
           <a:p>
             <a:pPr algn="ctr" eaLnBrk="1" latinLnBrk="0" hangingPunct="1"/>
             <a:endParaRPr kumimoji="0" lang="en-US"/>
@@ -3852,9 +3802,7 @@
         </p:style>
         <p:txBody>
           <a:bodyPr rtlCol="0" anchor="ctr"/>
-          <a:lstStyle>
-            <a:extLst/>
-          </a:lstStyle>
+          <a:lstStyle/>
           <a:p>
             <a:pPr algn="ctr" eaLnBrk="1" latinLnBrk="0" hangingPunct="1"/>
             <a:endParaRPr kumimoji="0" lang="en-US"/>
@@ -3893,15 +3841,12 @@
               <a:bevelT w="50800" h="10160"/>
             </a:sp3d>
           </a:bodyPr>
-          <a:lstStyle>
-            <a:extLst/>
-          </a:lstStyle>
-          <a:p>
-            <a:r>
-              <a:rPr kumimoji="0" lang="en-US" smtClean="0"/>
+          <a:lstStyle/>
+          <a:p>
+            <a:r>
+              <a:rPr kumimoji="0" lang="en-US"/>
               <a:t>Click to edit Master title style</a:t>
             </a:r>
-            <a:endParaRPr kumimoji="0" lang="en-US"/>
           </a:p>
         </p:txBody>
       </p:sp>
@@ -3928,44 +3873,41 @@
           <a:bodyPr vert="horz" lIns="54864" tIns="91440" rtlCol="0">
             <a:normAutofit/>
           </a:bodyPr>
-          <a:lstStyle>
-            <a:extLst/>
-          </a:lstStyle>
+          <a:lstStyle/>
           <a:p>
             <a:pPr lvl="0" eaLnBrk="1" latinLnBrk="0" hangingPunct="1"/>
             <a:r>
-              <a:rPr kumimoji="0" lang="en-US" smtClean="0"/>
+              <a:rPr kumimoji="0" lang="en-US"/>
               <a:t>Click to edit Master text styles</a:t>
             </a:r>
           </a:p>
           <a:p>
             <a:pPr lvl="1" eaLnBrk="1" latinLnBrk="0" hangingPunct="1"/>
             <a:r>
-              <a:rPr kumimoji="0" lang="en-US" smtClean="0"/>
+              <a:rPr kumimoji="0" lang="en-US"/>
               <a:t>Second level</a:t>
             </a:r>
           </a:p>
           <a:p>
             <a:pPr lvl="2" eaLnBrk="1" latinLnBrk="0" hangingPunct="1"/>
             <a:r>
-              <a:rPr kumimoji="0" lang="en-US" smtClean="0"/>
+              <a:rPr kumimoji="0" lang="en-US"/>
               <a:t>Third level</a:t>
             </a:r>
           </a:p>
           <a:p>
             <a:pPr lvl="3" eaLnBrk="1" latinLnBrk="0" hangingPunct="1"/>
             <a:r>
-              <a:rPr kumimoji="0" lang="en-US" smtClean="0"/>
+              <a:rPr kumimoji="0" lang="en-US"/>
               <a:t>Fourth level</a:t>
             </a:r>
           </a:p>
           <a:p>
             <a:pPr lvl="4" eaLnBrk="1" latinLnBrk="0" hangingPunct="1"/>
             <a:r>
-              <a:rPr kumimoji="0" lang="en-US" smtClean="0"/>
+              <a:rPr kumimoji="0" lang="en-US"/>
               <a:t>Fifth level</a:t>
             </a:r>
-            <a:endParaRPr kumimoji="0" lang="en-US"/>
           </a:p>
         </p:txBody>
       </p:sp>
@@ -4006,7 +3948,7 @@
             <a:fld id="{24E88B5C-CE1F-417E-9D80-6FD613872C83}" type="datetimeFigureOut">
               <a:rPr lang="en-US" smtClean="0"/>
               <a:pPr/>
-              <a:t>5/15/2017</a:t>
+              <a:t>11/19/2024</a:t>
             </a:fld>
             <a:endParaRPr lang="en-US"/>
           </a:p>
@@ -4436,45 +4378,29 @@
           <a:lstStyle/>
           <a:p>
             <a:r>
-              <a:rPr lang="en-US" sz="4000" dirty="0" smtClean="0"/>
+              <a:rPr lang="en-US" sz="4000" dirty="0"/>
               <a:t>The Ring Programming Language</a:t>
             </a:r>
-            <a:r>
-              <a:rPr lang="en-US" b="1" dirty="0" smtClean="0"/>
-              <a:t/>
-            </a:r>
             <a:br>
-              <a:rPr lang="en-US" b="1" dirty="0" smtClean="0"/>
+              <a:rPr lang="en-US" b="1" dirty="0"/>
             </a:br>
-            <a:r>
-              <a:rPr lang="en-US" b="1" dirty="0" smtClean="0"/>
-              <a:t/>
-            </a:r>
             <a:br>
-              <a:rPr lang="en-US" b="1" dirty="0" smtClean="0"/>
+              <a:rPr lang="en-US" b="1" dirty="0"/>
             </a:br>
             <a:r>
-              <a:rPr lang="en-US" dirty="0" smtClean="0"/>
+              <a:rPr lang="en-US" dirty="0"/>
               <a:t>Free-Open Source</a:t>
             </a:r>
-            <a:r>
-              <a:rPr lang="en-US" dirty="0" smtClean="0"/>
-              <a:t/>
-            </a:r>
             <a:br>
-              <a:rPr lang="en-US" dirty="0" smtClean="0"/>
+              <a:rPr lang="en-US" dirty="0"/>
             </a:br>
             <a:r>
-              <a:rPr lang="en-US" sz="3100" dirty="0" smtClean="0"/>
-              <a:t>http://ring-lang.net</a:t>
+              <a:rPr lang="en-US" sz="3100" dirty="0"/>
+              <a:t>https://ring-lang.net</a:t>
             </a:r>
             <a:br>
-              <a:rPr lang="en-US" sz="3100" dirty="0" smtClean="0"/>
+              <a:rPr lang="en-US" sz="3100" dirty="0"/>
             </a:br>
-            <a:r>
-              <a:rPr lang="en-US" b="1" dirty="0"/>
-              <a:t/>
-            </a:r>
             <a:br>
               <a:rPr lang="en-US" b="1" dirty="0"/>
             </a:br>
@@ -4487,13 +4413,6 @@
   <p:clrMapOvr>
     <a:masterClrMapping/>
   </p:clrMapOvr>
-  <p:timing>
-    <p:tnLst>
-      <p:par>
-        <p:cTn id="1" dur="indefinite" restart="never" nodeType="tmRoot"/>
-      </p:par>
-    </p:tnLst>
-  </p:timing>
 </p:sld>
 </file>
 
@@ -4530,10 +4449,9 @@
           <a:lstStyle/>
           <a:p>
             <a:r>
-              <a:rPr lang="en-US" dirty="0" smtClean="0"/>
+              <a:rPr lang="en-US" dirty="0"/>
               <a:t>Why Ring?</a:t>
             </a:r>
-            <a:endParaRPr lang="en-US" dirty="0"/>
           </a:p>
         </p:txBody>
       </p:sp>
@@ -4562,25 +4480,17 @@
             <a:pPr algn="just"/>
             <a:r>
               <a:rPr lang="en-US" sz="2800" dirty="0"/>
-              <a:t>The language is simple, trying to be natural, encourage organization and comes with transparent and visual implementation. It comes with compact syntax and a group of features that enable the programmer to create natural interfaces and declarative domain-specific languages in a fraction of time. It is very small, fast and comes with smart garbage collector that puts the memory under the programmer control. It supports many programming paradigms, comes with useful and practical libraries. The language is designed for productivity and developing high quality solutions that can scale</a:t>
-            </a:r>
-            <a:r>
-              <a:rPr lang="en-US" sz="2800" dirty="0" smtClean="0"/>
-              <a:t>.</a:t>
+              <a:t>The language is simple, trying to be natural, encourage organization and comes with transparent and visual implementation. It comes with compact syntax and a group of features that enable the programmer to create natural interfaces and declarative domain-specific languages in a fraction of time. It is very small, fast and comes with smart garbage collector that puts the memory under the programmer control. It supports many programming paradigms, comes with useful and practical libraries. The language is designed for productivity and developing high quality solutions that can scale.</a:t>
             </a:r>
           </a:p>
           <a:p>
             <a:pPr marL="118872" indent="0">
               <a:buNone/>
             </a:pPr>
-            <a:r>
-              <a:rPr lang="en-US" sz="2800" dirty="0" smtClean="0"/>
-              <a:t/>
-            </a:r>
             <a:br>
-              <a:rPr lang="en-US" sz="2800" dirty="0" smtClean="0"/>
+              <a:rPr lang="en-US" sz="2800" dirty="0"/>
             </a:br>
-            <a:endParaRPr lang="en-US" sz="3000" dirty="0" smtClean="0"/>
+            <a:endParaRPr lang="en-US" sz="3000" dirty="0"/>
           </a:p>
         </p:txBody>
       </p:sp>
@@ -4589,13 +4499,6 @@
   <p:clrMapOvr>
     <a:masterClrMapping/>
   </p:clrMapOvr>
-  <p:timing>
-    <p:tnLst>
-      <p:par>
-        <p:cTn id="1" dur="indefinite" restart="never" nodeType="tmRoot"/>
-      </p:par>
-    </p:tnLst>
-  </p:timing>
 </p:sld>
 </file>
 
@@ -4692,20 +4595,12 @@
           <a:p>
             <a:r>
               <a:rPr lang="en-US" sz="2800" dirty="0"/>
-              <a:t>Practical language designed for creating the next version of the Programming Without Coding Technology software</a:t>
-            </a:r>
-            <a:r>
-              <a:rPr lang="en-US" sz="2800" dirty="0" smtClean="0"/>
-              <a:t>.</a:t>
-            </a:r>
-            <a:r>
-              <a:rPr lang="en-US" sz="2800" dirty="0"/>
-              <a:t/>
+              <a:t>Practical language designed for creating the next version of the Programming Without Coding Technology software.</a:t>
             </a:r>
             <a:br>
               <a:rPr lang="en-US" sz="2800" dirty="0"/>
             </a:br>
-            <a:endParaRPr lang="en-US" sz="3000" dirty="0" smtClean="0"/>
+            <a:endParaRPr lang="en-US" sz="3000" dirty="0"/>
           </a:p>
         </p:txBody>
       </p:sp>
@@ -4719,13 +4614,6 @@
   <p:clrMapOvr>
     <a:masterClrMapping/>
   </p:clrMapOvr>
-  <p:timing>
-    <p:tnLst>
-      <p:par>
-        <p:cTn id="1" dur="indefinite" restart="never" nodeType="tmRoot"/>
-      </p:par>
-    </p:tnLst>
-  </p:timing>
 </p:sld>
 </file>
 
@@ -4793,21 +4681,8 @@
             <a:pPr algn="just"/>
             <a:r>
               <a:rPr lang="en-US" sz="2800" dirty="0"/>
-              <a:t>Ring is a very simple language, and has a very straightforward syntax. It encourages programmers to program </a:t>
-            </a:r>
-            <a:r>
-              <a:rPr lang="en-US" sz="2800" dirty="0" smtClean="0"/>
-              <a:t>without </a:t>
-            </a:r>
-            <a:r>
-              <a:rPr lang="en-US" sz="2800" dirty="0"/>
-              <a:t>boilerplate </a:t>
-            </a:r>
-            <a:r>
-              <a:rPr lang="en-US" sz="2800" dirty="0" smtClean="0"/>
-              <a:t>code.</a:t>
-            </a:r>
-            <a:endParaRPr lang="en-US" sz="2800" dirty="0"/>
+              <a:t>Ring is a very simple language, and has a very straightforward syntax. It encourages programmers to program without boilerplate code.</a:t>
+            </a:r>
           </a:p>
         </p:txBody>
       </p:sp>
@@ -4845,13 +4720,6 @@
   <p:clrMapOvr>
     <a:masterClrMapping/>
   </p:clrMapOvr>
-  <p:timing>
-    <p:tnLst>
-      <p:par>
-        <p:cTn id="1" dur="indefinite" restart="never" nodeType="tmRoot"/>
-      </p:par>
-    </p:tnLst>
-  </p:timing>
 </p:sld>
 </file>
 
@@ -4958,13 +4826,6 @@
   <p:clrMapOvr>
     <a:masterClrMapping/>
   </p:clrMapOvr>
-  <p:timing>
-    <p:tnLst>
-      <p:par>
-        <p:cTn id="1" dur="indefinite" restart="never" nodeType="tmRoot"/>
-      </p:par>
-    </p:tnLst>
-  </p:timing>
 </p:sld>
 </file>
 
@@ -5077,13 +4938,6 @@
   <p:clrMapOvr>
     <a:masterClrMapping/>
   </p:clrMapOvr>
-  <p:timing>
-    <p:tnLst>
-      <p:par>
-        <p:cTn id="1" dur="indefinite" restart="never" nodeType="tmRoot"/>
-      </p:par>
-    </p:tnLst>
-  </p:timing>
 </p:sld>
 </file>
 
@@ -5150,36 +5004,28 @@
           <a:p>
             <a:r>
               <a:rPr lang="en-US" sz="2800" dirty="0"/>
-              <a:t>Ring is not </a:t>
-            </a:r>
-            <a:r>
-              <a:rPr lang="en-US" sz="2800" dirty="0" smtClean="0"/>
-              <a:t>case-sensitive.</a:t>
+              <a:t>Ring is not case-sensitive.</a:t>
             </a:r>
           </a:p>
           <a:p>
             <a:endParaRPr lang="en-US" sz="2800" dirty="0"/>
           </a:p>
           <a:p>
-            <a:endParaRPr lang="en-US" sz="2800" dirty="0" smtClean="0"/>
-          </a:p>
-          <a:p>
             <a:endParaRPr lang="en-US" sz="2800" dirty="0"/>
           </a:p>
           <a:p>
-            <a:endParaRPr lang="en-US" sz="2800" dirty="0" smtClean="0"/>
-          </a:p>
-          <a:p>
             <a:endParaRPr lang="en-US" sz="2800" dirty="0"/>
           </a:p>
           <a:p>
-            <a:r>
-              <a:rPr lang="en-US" sz="2800" dirty="0"/>
-              <a:t>The list index starts from </a:t>
-            </a:r>
-            <a:r>
-              <a:rPr lang="en-US" sz="2800" dirty="0" smtClean="0"/>
-              <a:t>1</a:t>
+            <a:endParaRPr lang="en-US" sz="2800" dirty="0"/>
+          </a:p>
+          <a:p>
+            <a:endParaRPr lang="en-US" sz="2800" dirty="0"/>
+          </a:p>
+          <a:p>
+            <a:r>
+              <a:rPr lang="en-US" sz="2800" dirty="0"/>
+              <a:t>The list index starts from 1</a:t>
             </a:r>
           </a:p>
           <a:p>
@@ -5248,13 +5094,6 @@
   <p:clrMapOvr>
     <a:masterClrMapping/>
   </p:clrMapOvr>
-  <p:timing>
-    <p:tnLst>
-      <p:par>
-        <p:cTn id="1" dur="indefinite" restart="never" nodeType="tmRoot"/>
-      </p:par>
-    </p:tnLst>
-  </p:timing>
 </p:sld>
 </file>
 
@@ -5325,13 +5164,13 @@
             </a:r>
           </a:p>
           <a:p>
-            <a:endParaRPr lang="en-US" sz="2800" dirty="0" smtClean="0"/>
-          </a:p>
-          <a:p>
             <a:endParaRPr lang="en-US" sz="2800" dirty="0"/>
           </a:p>
           <a:p>
-            <a:endParaRPr lang="en-US" sz="2800" dirty="0" smtClean="0"/>
+            <a:endParaRPr lang="en-US" sz="2800" dirty="0"/>
+          </a:p>
+          <a:p>
+            <a:endParaRPr lang="en-US" sz="2800" dirty="0"/>
           </a:p>
           <a:p>
             <a:endParaRPr lang="en-US" sz="2800" dirty="0"/>
@@ -5378,13 +5217,6 @@
   <p:clrMapOvr>
     <a:masterClrMapping/>
   </p:clrMapOvr>
-  <p:timing>
-    <p:tnLst>
-      <p:par>
-        <p:cTn id="1" dur="indefinite" restart="never" nodeType="tmRoot"/>
-      </p:par>
-    </p:tnLst>
-  </p:timing>
 </p:sld>
 </file>
 
@@ -5453,13 +5285,12 @@
               <a:rPr lang="en-US" sz="2800" dirty="0"/>
               <a:t>The assignment operator uses Deep copy (no references in this operation)</a:t>
             </a:r>
-            <a:endParaRPr lang="en-US" sz="2800" dirty="0" smtClean="0"/>
           </a:p>
           <a:p>
             <a:endParaRPr lang="en-US" sz="2800" dirty="0"/>
           </a:p>
           <a:p>
-            <a:endParaRPr lang="en-US" sz="2800" dirty="0" smtClean="0"/>
+            <a:endParaRPr lang="en-US" sz="2800" dirty="0"/>
           </a:p>
           <a:p>
             <a:endParaRPr lang="en-US" sz="2800" dirty="0"/>
@@ -5506,13 +5337,6 @@
   <p:clrMapOvr>
     <a:masterClrMapping/>
   </p:clrMapOvr>
-  <p:timing>
-    <p:tnLst>
-      <p:par>
-        <p:cTn id="1" dur="indefinite" restart="never" nodeType="tmRoot"/>
-      </p:par>
-    </p:tnLst>
-  </p:timing>
 </p:sld>
 </file>
 
@@ -5579,19 +5403,11 @@
           <a:p>
             <a:r>
               <a:rPr lang="en-US" sz="2800" dirty="0"/>
-              <a:t>Pass numbers and strings by value, but pass lists and objects by reference</a:t>
-            </a:r>
-            <a:r>
-              <a:rPr lang="en-US" sz="2800" dirty="0" smtClean="0"/>
-              <a:t>. The </a:t>
-            </a:r>
-            <a:r>
-              <a:rPr lang="en-US" sz="2800" dirty="0"/>
-              <a:t>for in loop can update the list items.</a:t>
-            </a:r>
-          </a:p>
-          <a:p>
-            <a:endParaRPr lang="en-US" sz="2800" dirty="0" smtClean="0"/>
+              <a:t>Pass numbers and strings by value, but pass lists and objects by reference. The for in loop can update the list items.</a:t>
+            </a:r>
+          </a:p>
+          <a:p>
+            <a:endParaRPr lang="en-US" sz="2800" dirty="0"/>
           </a:p>
           <a:p>
             <a:endParaRPr lang="en-US" sz="2800" dirty="0"/>
@@ -5638,13 +5454,6 @@
   <p:clrMapOvr>
     <a:masterClrMapping/>
   </p:clrMapOvr>
-  <p:timing>
-    <p:tnLst>
-      <p:par>
-        <p:cTn id="1" dur="indefinite" restart="never" nodeType="tmRoot"/>
-      </p:par>
-    </p:tnLst>
-  </p:timing>
 </p:sld>
 </file>
 
@@ -5711,39 +5520,26 @@
           <a:p>
             <a:r>
               <a:rPr lang="en-US" sz="2800" dirty="0"/>
-              <a:t>Using Lists during </a:t>
-            </a:r>
-            <a:r>
-              <a:rPr lang="en-US" sz="2800" dirty="0" smtClean="0"/>
-              <a:t>definition</a:t>
+              <a:t>Using Lists during definition</a:t>
             </a:r>
           </a:p>
           <a:p>
             <a:endParaRPr lang="en-US" sz="2800" dirty="0"/>
           </a:p>
           <a:p>
-            <a:endParaRPr lang="en-US" sz="2800" dirty="0" smtClean="0"/>
-          </a:p>
-          <a:p>
             <a:endParaRPr lang="en-US" sz="2800" dirty="0"/>
           </a:p>
           <a:p>
-            <a:endParaRPr lang="en-US" sz="2800" dirty="0" smtClean="0"/>
-          </a:p>
-          <a:p>
-            <a:r>
-              <a:rPr lang="en-US" sz="2800" dirty="0" smtClean="0"/>
-              <a:t>Exit </a:t>
-            </a:r>
-            <a:r>
-              <a:rPr lang="en-US" sz="2800" dirty="0"/>
-              <a:t>from more than one </a:t>
-            </a:r>
-            <a:r>
-              <a:rPr lang="en-US" sz="2800" dirty="0" smtClean="0"/>
-              <a:t>loop</a:t>
-            </a:r>
             <a:endParaRPr lang="en-US" sz="2800" dirty="0"/>
+          </a:p>
+          <a:p>
+            <a:endParaRPr lang="en-US" sz="2800" dirty="0"/>
+          </a:p>
+          <a:p>
+            <a:r>
+              <a:rPr lang="en-US" sz="2800" dirty="0"/>
+              <a:t>Exit from more than one loop</a:t>
+            </a:r>
           </a:p>
           <a:p>
             <a:pPr marL="118872" indent="0">
@@ -5811,13 +5607,6 @@
   <p:clrMapOvr>
     <a:masterClrMapping/>
   </p:clrMapOvr>
-  <p:timing>
-    <p:tnLst>
-      <p:par>
-        <p:cTn id="1" dur="indefinite" restart="never" nodeType="tmRoot"/>
-      </p:par>
-    </p:tnLst>
-  </p:timing>
 </p:sld>
 </file>
 
@@ -5861,55 +5650,43 @@
           <a:lstStyle/>
           <a:p>
             <a:r>
-              <a:rPr lang="en-US" sz="4000" dirty="0" smtClean="0"/>
+              <a:rPr lang="en-US" sz="4000" dirty="0"/>
               <a:t>Contents :-</a:t>
             </a:r>
             <a:br>
-              <a:rPr lang="en-US" sz="4000" dirty="0" smtClean="0"/>
+              <a:rPr lang="en-US" sz="4000" dirty="0"/>
             </a:br>
-            <a:r>
-              <a:rPr lang="en-US" sz="4000" dirty="0" smtClean="0"/>
-              <a:t/>
-            </a:r>
             <a:br>
-              <a:rPr lang="en-US" sz="4000" dirty="0" smtClean="0"/>
+              <a:rPr lang="en-US" sz="4000" dirty="0"/>
             </a:br>
             <a:r>
-              <a:rPr lang="en-US" sz="4000" dirty="0" smtClean="0"/>
+              <a:rPr lang="en-US" sz="4000" dirty="0"/>
               <a:t>[1] Motivation</a:t>
             </a:r>
             <a:br>
-              <a:rPr lang="en-US" sz="4000" dirty="0" smtClean="0"/>
+              <a:rPr lang="en-US" sz="4000" dirty="0"/>
             </a:br>
             <a:r>
-              <a:rPr lang="en-US" sz="4000" dirty="0" smtClean="0"/>
+              <a:rPr lang="en-US" sz="4000" dirty="0"/>
               <a:t>[2] Features</a:t>
             </a:r>
             <a:br>
-              <a:rPr lang="en-US" sz="4000" dirty="0" smtClean="0"/>
+              <a:rPr lang="en-US" sz="4000" dirty="0"/>
             </a:br>
             <a:r>
-              <a:rPr lang="en-US" sz="4000" dirty="0" smtClean="0"/>
+              <a:rPr lang="en-US" sz="4000" dirty="0"/>
               <a:t>[3] Why Ring?</a:t>
             </a:r>
-            <a:r>
-              <a:rPr lang="ar-SA" sz="4000" dirty="0" smtClean="0"/>
-              <a:t/>
-            </a:r>
             <a:br>
-              <a:rPr lang="ar-SA" sz="4000" dirty="0" smtClean="0"/>
+              <a:rPr lang="ar-SA" sz="4000" dirty="0"/>
             </a:br>
             <a:r>
-              <a:rPr lang="en-US" sz="4000" dirty="0" smtClean="0"/>
+              <a:rPr lang="en-US" sz="4000" dirty="0"/>
               <a:t>[4] Practical Demo</a:t>
             </a:r>
             <a:br>
-              <a:rPr lang="en-US" sz="4000" dirty="0" smtClean="0"/>
+              <a:rPr lang="en-US" sz="4000" dirty="0"/>
             </a:br>
-            <a:r>
-              <a:rPr lang="en-US" b="1" dirty="0"/>
-              <a:t/>
-            </a:r>
             <a:br>
               <a:rPr lang="en-US" b="1" dirty="0"/>
             </a:br>
@@ -5922,13 +5699,6 @@
   <p:clrMapOvr>
     <a:masterClrMapping/>
   </p:clrMapOvr>
-  <p:timing>
-    <p:tnLst>
-      <p:par>
-        <p:cTn id="1" dur="indefinite" restart="never" nodeType="tmRoot"/>
-      </p:par>
-    </p:tnLst>
-  </p:timing>
 </p:sld>
 </file>
 
@@ -5996,32 +5766,19 @@
             <a:pPr algn="just"/>
             <a:r>
               <a:rPr lang="en-US" sz="2800" dirty="0"/>
-              <a:t>The language encourage organization, Forget bad days using languages where the programmer start with function then class then function and a strange mix between things! </a:t>
-            </a:r>
-            <a:r>
-              <a:rPr lang="en-US" sz="2800" dirty="0" smtClean="0"/>
-              <a:t> Each </a:t>
-            </a:r>
-            <a:r>
-              <a:rPr lang="en-US" sz="2800" dirty="0"/>
-              <a:t>source file follow the next structure </a:t>
-            </a:r>
-            <a:endParaRPr lang="en-US" sz="2800" dirty="0" smtClean="0"/>
-          </a:p>
-          <a:p>
-            <a:r>
-              <a:rPr lang="en-US" sz="2800" dirty="0" smtClean="0"/>
+              <a:t>The language encourage organization, Forget bad days using languages where the programmer start with function then class then function and a strange mix between things!  Each source file follow the next structure </a:t>
+            </a:r>
+          </a:p>
+          <a:p>
+            <a:r>
+              <a:rPr lang="en-US" sz="2800" dirty="0"/>
               <a:t>Load File</a:t>
             </a:r>
           </a:p>
           <a:p>
             <a:r>
-              <a:rPr lang="en-US" sz="2800" dirty="0" smtClean="0"/>
-              <a:t>Statements </a:t>
-            </a:r>
-            <a:r>
-              <a:rPr lang="en-US" sz="2800" dirty="0"/>
-              <a:t>and Global Variables</a:t>
+              <a:rPr lang="en-US" sz="2800" dirty="0"/>
+              <a:t>Statements and Global Variables</a:t>
             </a:r>
           </a:p>
           <a:p>
@@ -6042,7 +5799,6 @@
               <a:rPr lang="en-US" sz="2800" dirty="0"/>
               <a:t>This enable us to use Packages, Classes and Functions without the need to use a keyword to end these components. </a:t>
             </a:r>
-            <a:endParaRPr lang="en-US" sz="2800" dirty="0" smtClean="0"/>
           </a:p>
         </p:txBody>
       </p:sp>
@@ -6056,13 +5812,6 @@
   <p:clrMapOvr>
     <a:masterClrMapping/>
   </p:clrMapOvr>
-  <p:timing>
-    <p:tnLst>
-      <p:par>
-        <p:cTn id="1" dur="indefinite" restart="never" nodeType="tmRoot"/>
-      </p:par>
-    </p:tnLst>
-  </p:timing>
 </p:sld>
 </file>
 
@@ -6099,10 +5848,9 @@
           <a:lstStyle/>
           <a:p>
             <a:r>
-              <a:rPr lang="en-US" b="0" dirty="0" smtClean="0"/>
+              <a:rPr lang="en-US" b="0" dirty="0"/>
               <a:t>Comments</a:t>
             </a:r>
-            <a:endParaRPr lang="en-US" b="0" dirty="0"/>
           </a:p>
         </p:txBody>
       </p:sp>
@@ -6132,29 +5880,18 @@
               <a:rPr lang="en-US" sz="2800" dirty="0"/>
               <a:t>We can write one line comments and multi-line comments </a:t>
             </a:r>
-            <a:endParaRPr lang="en-US" sz="2800" dirty="0" smtClean="0"/>
-          </a:p>
-          <a:p>
-            <a:r>
-              <a:rPr lang="en-US" sz="2800" dirty="0" smtClean="0"/>
-              <a:t>The </a:t>
-            </a:r>
-            <a:r>
-              <a:rPr lang="en-US" sz="2800" dirty="0"/>
-              <a:t>comment starts with # or // </a:t>
-            </a:r>
-            <a:endParaRPr lang="en-US" sz="2800" dirty="0" smtClean="0"/>
-          </a:p>
-          <a:p>
-            <a:r>
-              <a:rPr lang="en-US" sz="2800" dirty="0" smtClean="0"/>
-              <a:t>Multi-line </a:t>
-            </a:r>
-            <a:r>
-              <a:rPr lang="en-US" sz="2800" dirty="0"/>
-              <a:t>comments are written between /* and */</a:t>
-            </a:r>
-            <a:endParaRPr lang="en-US" sz="2800" dirty="0" smtClean="0"/>
+          </a:p>
+          <a:p>
+            <a:r>
+              <a:rPr lang="en-US" sz="2800" dirty="0"/>
+              <a:t>The comment starts with # or // </a:t>
+            </a:r>
+          </a:p>
+          <a:p>
+            <a:r>
+              <a:rPr lang="en-US" sz="2800" dirty="0"/>
+              <a:t>Multi-line comments are written between /* and */</a:t>
+            </a:r>
           </a:p>
         </p:txBody>
       </p:sp>
@@ -6192,13 +5929,6 @@
   <p:clrMapOvr>
     <a:masterClrMapping/>
   </p:clrMapOvr>
-  <p:timing>
-    <p:tnLst>
-      <p:par>
-        <p:cTn id="1" dur="indefinite" restart="never" nodeType="tmRoot"/>
-      </p:par>
-    </p:tnLst>
-  </p:timing>
 </p:sld>
 </file>
 
@@ -6265,21 +5995,13 @@
           <a:p>
             <a:r>
               <a:rPr lang="en-US" sz="2800" dirty="0"/>
-              <a:t>Ring comes with transparent implementation. We can know what is happening in each compiler stage and what is going on during the run-time by the Virtual </a:t>
-            </a:r>
-            <a:r>
-              <a:rPr lang="en-US" sz="2800" dirty="0" smtClean="0"/>
-              <a:t>Machine</a:t>
-            </a:r>
-          </a:p>
-          <a:p>
-            <a:r>
-              <a:rPr lang="en-US" sz="2800" dirty="0" smtClean="0"/>
-              <a:t> </a:t>
-            </a:r>
-            <a:r>
-              <a:rPr lang="en-US" sz="2800" dirty="0"/>
-              <a:t>Example : ring </a:t>
+              <a:t>Ring comes with transparent implementation. We can know what is happening in each compiler stage and what is going on during the run-time by the Virtual Machine</a:t>
+            </a:r>
+          </a:p>
+          <a:p>
+            <a:r>
+              <a:rPr lang="en-US" sz="2800" dirty="0"/>
+              <a:t> Example : ring </a:t>
             </a:r>
             <a:r>
               <a:rPr lang="en-US" sz="2800" dirty="0" err="1"/>
@@ -6293,7 +6015,7 @@
               <a:rPr lang="en-US" sz="2800" dirty="0" err="1"/>
               <a:t>ic</a:t>
             </a:r>
-            <a:endParaRPr lang="en-US" sz="2800" dirty="0" smtClean="0"/>
+            <a:endParaRPr lang="en-US" sz="2800" dirty="0"/>
           </a:p>
         </p:txBody>
       </p:sp>
@@ -6331,13 +6053,6 @@
   <p:clrMapOvr>
     <a:masterClrMapping/>
   </p:clrMapOvr>
-  <p:timing>
-    <p:tnLst>
-      <p:par>
-        <p:cTn id="1" dur="indefinite" restart="never" nodeType="tmRoot"/>
-      </p:par>
-    </p:tnLst>
-  </p:timing>
 </p:sld>
 </file>
 
@@ -6380,35 +6095,6 @@
           </a:p>
         </p:txBody>
       </p:sp>
-      <p:sp>
-        <p:nvSpPr>
-          <p:cNvPr id="3" name="Content Placeholder 2"/>
-          <p:cNvSpPr>
-            <a:spLocks noGrp="1"/>
-          </p:cNvSpPr>
-          <p:nvPr>
-            <p:ph idx="1"/>
-          </p:nvPr>
-        </p:nvSpPr>
-        <p:spPr>
-          <a:xfrm>
-            <a:off x="152400" y="1524000"/>
-            <a:ext cx="8763000" cy="4876801"/>
-          </a:xfrm>
-        </p:spPr>
-        <p:txBody>
-          <a:bodyPr>
-            <a:noAutofit/>
-          </a:bodyPr>
-          <a:lstStyle/>
-          <a:p>
-            <a:pPr marL="118872" indent="0">
-              <a:buNone/>
-            </a:pPr>
-            <a:endParaRPr lang="en-US" sz="2800" dirty="0" smtClean="0"/>
-          </a:p>
-        </p:txBody>
-      </p:sp>
       <p:pic>
         <p:nvPicPr>
           <p:cNvPr id="4" name="Picture 3"/>
@@ -6443,13 +6129,6 @@
   <p:clrMapOvr>
     <a:masterClrMapping/>
   </p:clrMapOvr>
-  <p:timing>
-    <p:tnLst>
-      <p:par>
-        <p:cTn id="1" dur="indefinite" restart="never" nodeType="tmRoot"/>
-      </p:par>
-    </p:tnLst>
-  </p:timing>
 </p:sld>
 </file>
 
@@ -6517,7 +6196,7 @@
             <a:pPr marL="118872" indent="0">
               <a:buNone/>
             </a:pPr>
-            <a:endParaRPr lang="en-US" sz="2800" dirty="0" smtClean="0"/>
+            <a:endParaRPr lang="en-US" sz="2800" dirty="0"/>
           </a:p>
         </p:txBody>
       </p:sp>
@@ -6555,13 +6234,6 @@
   <p:clrMapOvr>
     <a:masterClrMapping/>
   </p:clrMapOvr>
-  <p:timing>
-    <p:tnLst>
-      <p:par>
-        <p:cTn id="1" dur="indefinite" restart="never" nodeType="tmRoot"/>
-      </p:par>
-    </p:tnLst>
-  </p:timing>
 </p:sld>
 </file>
 
@@ -6598,12 +6270,8 @@
           <a:lstStyle/>
           <a:p>
             <a:r>
-              <a:rPr lang="en-US" b="0" dirty="0" smtClean="0"/>
-              <a:t>Visual </a:t>
-            </a:r>
-            <a:r>
               <a:rPr lang="en-US" b="0" dirty="0"/>
-              <a:t>Implementation</a:t>
+              <a:t>Visual Implementation</a:t>
             </a:r>
           </a:p>
         </p:txBody>
@@ -6640,7 +6308,7 @@
               </a:rPr>
               <a:t>PWCT visual programming tool </a:t>
             </a:r>
-            <a:endParaRPr lang="en-US" sz="2800" dirty="0" smtClean="0"/>
+            <a:endParaRPr lang="en-US" sz="2800" dirty="0"/>
           </a:p>
         </p:txBody>
       </p:sp>
@@ -6678,13 +6346,6 @@
   <p:clrMapOvr>
     <a:masterClrMapping/>
   </p:clrMapOvr>
-  <p:timing>
-    <p:tnLst>
-      <p:par>
-        <p:cTn id="1" dur="indefinite" restart="never" nodeType="tmRoot"/>
-      </p:par>
-    </p:tnLst>
-  </p:timing>
 </p:sld>
 </file>
 
@@ -6721,12 +6382,8 @@
           <a:lstStyle/>
           <a:p>
             <a:r>
-              <a:rPr lang="en-US" b="0" dirty="0" smtClean="0"/>
-              <a:t>Visual </a:t>
-            </a:r>
-            <a:r>
               <a:rPr lang="en-US" b="0" dirty="0"/>
-              <a:t>Implementation</a:t>
+              <a:t>Visual Implementation</a:t>
             </a:r>
           </a:p>
         </p:txBody>
@@ -6763,7 +6420,7 @@
               </a:rPr>
               <a:t>PWCT visual programming tool </a:t>
             </a:r>
-            <a:endParaRPr lang="en-US" sz="2800" dirty="0" smtClean="0"/>
+            <a:endParaRPr lang="en-US" sz="2800" dirty="0"/>
           </a:p>
         </p:txBody>
       </p:sp>
@@ -6801,13 +6458,6 @@
   <p:clrMapOvr>
     <a:masterClrMapping/>
   </p:clrMapOvr>
-  <p:timing>
-    <p:tnLst>
-      <p:par>
-        <p:cTn id="1" dur="indefinite" restart="never" nodeType="tmRoot"/>
-      </p:par>
-    </p:tnLst>
-  </p:timing>
 </p:sld>
 </file>
 
@@ -6882,11 +6532,7 @@
             </a:r>
             <a:r>
               <a:rPr lang="en-US" sz="2800" dirty="0"/>
-              <a:t>, you don't need to write ; after statements, also you don't need to press ENTER or TAB, so we can write the next </a:t>
-            </a:r>
-            <a:r>
-              <a:rPr lang="en-US" sz="2800" dirty="0" smtClean="0"/>
-              <a:t>code</a:t>
+              <a:t>, you don't need to write ; after statements, also you don't need to press ENTER or TAB, so we can write the next code</a:t>
             </a:r>
           </a:p>
         </p:txBody>
@@ -6925,13 +6571,6 @@
   <p:clrMapOvr>
     <a:masterClrMapping/>
   </p:clrMapOvr>
-  <p:timing>
-    <p:tnLst>
-      <p:par>
-        <p:cTn id="1" dur="indefinite" restart="never" nodeType="tmRoot"/>
-      </p:par>
-    </p:tnLst>
-  </p:timing>
 </p:sld>
 </file>
 
@@ -7016,7 +6655,6 @@
               <a:rPr lang="en-US" sz="2800" dirty="0"/>
               <a:t>.</a:t>
             </a:r>
-            <a:endParaRPr lang="en-US" sz="2800" dirty="0" smtClean="0"/>
           </a:p>
         </p:txBody>
       </p:sp>
@@ -7054,13 +6692,6 @@
   <p:clrMapOvr>
     <a:masterClrMapping/>
   </p:clrMapOvr>
-  <p:timing>
-    <p:tnLst>
-      <p:par>
-        <p:cTn id="1" dur="indefinite" restart="never" nodeType="tmRoot"/>
-      </p:par>
-    </p:tnLst>
-  </p:timing>
 </p:sld>
 </file>
 
@@ -7137,7 +6768,6 @@
               <a:rPr lang="en-US" sz="2800" dirty="0"/>
               <a:t>, In this example we will create new object, set the object attributes then print the object values.</a:t>
             </a:r>
-            <a:endParaRPr lang="en-US" sz="2800" dirty="0" smtClean="0"/>
           </a:p>
         </p:txBody>
       </p:sp>
@@ -7175,13 +6805,6 @@
   <p:clrMapOvr>
     <a:masterClrMapping/>
   </p:clrMapOvr>
-  <p:timing>
-    <p:tnLst>
-      <p:par>
-        <p:cTn id="1" dur="indefinite" restart="never" nodeType="tmRoot"/>
-      </p:par>
-    </p:tnLst>
-  </p:timing>
 </p:sld>
 </file>
 
@@ -7218,10 +6841,9 @@
           <a:lstStyle/>
           <a:p>
             <a:r>
-              <a:rPr lang="en-US" dirty="0" smtClean="0"/>
+              <a:rPr lang="en-US" dirty="0"/>
               <a:t>Motivation </a:t>
             </a:r>
-            <a:endParaRPr lang="en-US" dirty="0"/>
           </a:p>
         </p:txBody>
       </p:sp>
@@ -7249,7 +6871,7 @@
           <a:p>
             <a:pPr algn="just"/>
             <a:r>
-              <a:rPr lang="en-US" sz="3000" dirty="0" smtClean="0"/>
+              <a:rPr lang="en-US" sz="3000" dirty="0"/>
               <a:t>Creating a new version of the Programming Without Coding Technology (PWCT) Software.</a:t>
             </a:r>
           </a:p>
@@ -7257,12 +6879,12 @@
             <a:pPr marL="118872" indent="0" algn="just">
               <a:buNone/>
             </a:pPr>
-            <a:endParaRPr lang="en-US" sz="3000" dirty="0" smtClean="0"/>
+            <a:endParaRPr lang="en-US" sz="3000" dirty="0"/>
           </a:p>
           <a:p>
             <a:pPr algn="just"/>
             <a:r>
-              <a:rPr lang="en-US" sz="3000" dirty="0" smtClean="0"/>
+              <a:rPr lang="en-US" sz="3000" dirty="0"/>
               <a:t>The current version, PWCT 1.9 is developed for Windows (250 KLOC , over 17 M Downloads and over 200K Users).</a:t>
             </a:r>
           </a:p>
@@ -7270,21 +6892,13 @@
             <a:pPr marL="118872" indent="0" algn="just">
               <a:buNone/>
             </a:pPr>
-            <a:endParaRPr lang="en-US" sz="3000" dirty="0" smtClean="0"/>
+            <a:endParaRPr lang="en-US" sz="3000" dirty="0"/>
           </a:p>
           <a:p>
             <a:pPr algn="just"/>
             <a:r>
-              <a:rPr lang="en-US" sz="2800" dirty="0" smtClean="0"/>
-              <a:t>We </a:t>
-            </a:r>
-            <a:r>
-              <a:rPr lang="en-US" sz="2800" dirty="0"/>
-              <a:t>decided to use one programming language for creating the development environment, for components scripting &amp; for creating the </a:t>
-            </a:r>
-            <a:r>
-              <a:rPr lang="en-US" sz="2800" dirty="0" smtClean="0"/>
-              <a:t>applications.</a:t>
+              <a:rPr lang="en-US" sz="2800" dirty="0"/>
+              <a:t>We decided to use one programming language for creating the development environment, for components scripting &amp; for creating the applications.</a:t>
             </a:r>
           </a:p>
         </p:txBody>
@@ -7294,13 +6908,6 @@
   <p:clrMapOvr>
     <a:masterClrMapping/>
   </p:clrMapOvr>
-  <p:timing>
-    <p:tnLst>
-      <p:par>
-        <p:cTn id="1" dur="indefinite" restart="never" nodeType="tmRoot"/>
-      </p:par>
-    </p:tnLst>
-  </p:timing>
 </p:sld>
 </file>
 
@@ -7377,7 +6984,6 @@
               <a:rPr lang="en-US" sz="2800" dirty="0"/>
               <a:t>.</a:t>
             </a:r>
-            <a:endParaRPr lang="en-US" sz="2800" dirty="0" smtClean="0"/>
           </a:p>
         </p:txBody>
       </p:sp>
@@ -7415,13 +7021,6 @@
   <p:clrMapOvr>
     <a:masterClrMapping/>
   </p:clrMapOvr>
-  <p:timing>
-    <p:tnLst>
-      <p:par>
-        <p:cTn id="1" dur="indefinite" restart="never" nodeType="tmRoot"/>
-      </p:par>
-    </p:tnLst>
-  </p:timing>
 </p:sld>
 </file>
 
@@ -7494,7 +7093,7 @@
               <a:rPr lang="en-US" sz="2800" b="1" dirty="0"/>
               <a:t>call a method after accessing the object using { }</a:t>
             </a:r>
-            <a:endParaRPr lang="en-US" sz="2800" dirty="0" smtClean="0"/>
+            <a:endParaRPr lang="en-US" sz="2800" dirty="0"/>
           </a:p>
         </p:txBody>
       </p:sp>
@@ -7532,13 +7131,6 @@
   <p:clrMapOvr>
     <a:masterClrMapping/>
   </p:clrMapOvr>
-  <p:timing>
-    <p:tnLst>
-      <p:par>
-        <p:cTn id="1" dur="indefinite" restart="never" nodeType="tmRoot"/>
-      </p:par>
-    </p:tnLst>
-  </p:timing>
 </p:sld>
 </file>
 
@@ -7615,7 +7207,6 @@
               <a:rPr lang="en-US" sz="2800" dirty="0"/>
               <a:t>.</a:t>
             </a:r>
-            <a:endParaRPr lang="en-US" sz="2800" dirty="0" smtClean="0"/>
           </a:p>
         </p:txBody>
       </p:sp>
@@ -7653,13 +7244,6 @@
   <p:clrMapOvr>
     <a:masterClrMapping/>
   </p:clrMapOvr>
-  <p:timing>
-    <p:tnLst>
-      <p:par>
-        <p:cTn id="1" dur="indefinite" restart="never" nodeType="tmRoot"/>
-      </p:par>
-    </p:tnLst>
-  </p:timing>
 </p:sld>
 </file>
 
@@ -7738,7 +7322,6 @@
               <a:rPr lang="en-US" sz="2800" dirty="0"/>
               <a:t>() it will be executed!</a:t>
             </a:r>
-            <a:endParaRPr lang="en-US" sz="2800" dirty="0" smtClean="0"/>
           </a:p>
         </p:txBody>
       </p:sp>
@@ -7776,13 +7359,6 @@
   <p:clrMapOvr>
     <a:masterClrMapping/>
   </p:clrMapOvr>
-  <p:timing>
-    <p:tnLst>
-      <p:par>
-        <p:cTn id="1" dur="indefinite" restart="never" nodeType="tmRoot"/>
-      </p:par>
-    </p:tnLst>
-  </p:timing>
 </p:sld>
 </file>
 
@@ -7861,7 +7437,6 @@
               <a:rPr lang="en-US" sz="2800" dirty="0"/>
               <a:t>() it will be executed!</a:t>
             </a:r>
-            <a:endParaRPr lang="en-US" sz="2800" dirty="0" smtClean="0"/>
           </a:p>
         </p:txBody>
       </p:sp>
@@ -7899,13 +7474,6 @@
   <p:clrMapOvr>
     <a:masterClrMapping/>
   </p:clrMapOvr>
-  <p:timing>
-    <p:tnLst>
-      <p:par>
-        <p:cTn id="1" dur="indefinite" restart="never" nodeType="tmRoot"/>
-      </p:par>
-    </p:tnLst>
-  </p:timing>
 </p:sld>
 </file>
 
@@ -7986,28 +7554,23 @@
             </a:r>
             <a:r>
               <a:rPr lang="en-US" sz="2800" b="1" dirty="0"/>
-              <a:t>() </a:t>
-            </a:r>
-            <a:r>
-              <a:rPr lang="en-US" sz="2800" b="1" dirty="0" smtClean="0"/>
-              <a:t>function</a:t>
+              <a:t>() function</a:t>
             </a:r>
           </a:p>
           <a:p>
             <a:endParaRPr lang="en-US" sz="2800" b="1" dirty="0"/>
           </a:p>
           <a:p>
-            <a:endParaRPr lang="en-US" sz="2800" b="1" dirty="0" smtClean="0"/>
-          </a:p>
-          <a:p>
             <a:endParaRPr lang="en-US" sz="2800" b="1" dirty="0"/>
           </a:p>
           <a:p>
+            <a:endParaRPr lang="en-US" sz="2800" b="1" dirty="0"/>
+          </a:p>
+          <a:p>
             <a:r>
               <a:rPr lang="en-US" sz="2800" dirty="0"/>
               <a:t>We can create a list then execute code generated from that list</a:t>
             </a:r>
-            <a:endParaRPr lang="en-US" sz="2800" dirty="0" smtClean="0"/>
           </a:p>
         </p:txBody>
       </p:sp>
@@ -8069,13 +7632,6 @@
   <p:clrMapOvr>
     <a:masterClrMapping/>
   </p:clrMapOvr>
-  <p:timing>
-    <p:tnLst>
-      <p:par>
-        <p:cTn id="1" dur="indefinite" restart="never" nodeType="tmRoot"/>
-      </p:par>
-    </p:tnLst>
-  </p:timing>
 </p:sld>
 </file>
 
@@ -8160,23 +7716,19 @@
             </a:r>
             <a:r>
               <a:rPr lang="en-US" sz="2800" dirty="0"/>
-              <a:t>) function</a:t>
-            </a:r>
-            <a:r>
-              <a:rPr lang="en-US" sz="2800" dirty="0" smtClean="0"/>
-              <a:t>.</a:t>
+              <a:t>) function.</a:t>
             </a:r>
           </a:p>
           <a:p>
             <a:endParaRPr lang="en-US" sz="2800" b="1" dirty="0"/>
           </a:p>
           <a:p>
-            <a:endParaRPr lang="en-US" sz="2800" b="1" dirty="0" smtClean="0"/>
-          </a:p>
-          <a:p>
             <a:endParaRPr lang="en-US" sz="2800" b="1" dirty="0"/>
           </a:p>
           <a:p>
+            <a:endParaRPr lang="en-US" sz="2800" b="1" dirty="0"/>
+          </a:p>
+          <a:p>
             <a:r>
               <a:rPr lang="en-US" sz="2800" dirty="0"/>
               <a:t>The next example presents how to create a class that defines two instructions</a:t>
@@ -8205,7 +7757,7 @@
             <a:endParaRPr lang="en-US" sz="2800" b="1" dirty="0"/>
           </a:p>
           <a:p>
-            <a:endParaRPr lang="en-US" sz="2800" b="1" dirty="0" smtClean="0"/>
+            <a:endParaRPr lang="en-US" sz="2800" b="1" dirty="0"/>
           </a:p>
         </p:txBody>
       </p:sp>
@@ -8243,13 +7795,6 @@
   <p:clrMapOvr>
     <a:masterClrMapping/>
   </p:clrMapOvr>
-  <p:timing>
-    <p:tnLst>
-      <p:par>
-        <p:cTn id="1" dur="indefinite" restart="never" nodeType="tmRoot"/>
-      </p:par>
-    </p:tnLst>
-  </p:timing>
 </p:sld>
 </file>
 
@@ -8319,7 +7864,7 @@
             <a:pPr marL="118872" indent="0">
               <a:buNone/>
             </a:pPr>
-            <a:endParaRPr lang="en-US" sz="2800" b="1" dirty="0" smtClean="0"/>
+            <a:endParaRPr lang="en-US" sz="2800" b="1" dirty="0"/>
           </a:p>
         </p:txBody>
       </p:sp>
@@ -8357,13 +7902,6 @@
   <p:clrMapOvr>
     <a:masterClrMapping/>
   </p:clrMapOvr>
-  <p:timing>
-    <p:tnLst>
-      <p:par>
-        <p:cTn id="1" dur="indefinite" restart="never" nodeType="tmRoot"/>
-      </p:par>
-    </p:tnLst>
-  </p:timing>
 </p:sld>
 </file>
 
@@ -8433,7 +7971,7 @@
             <a:pPr marL="118872" indent="0">
               <a:buNone/>
             </a:pPr>
-            <a:endParaRPr lang="en-US" sz="2800" b="1" dirty="0" smtClean="0"/>
+            <a:endParaRPr lang="en-US" sz="2800" b="1" dirty="0"/>
           </a:p>
         </p:txBody>
       </p:sp>
@@ -8471,13 +8009,6 @@
   <p:clrMapOvr>
     <a:masterClrMapping/>
   </p:clrMapOvr>
-  <p:timing>
-    <p:tnLst>
-      <p:par>
-        <p:cTn id="1" dur="indefinite" restart="never" nodeType="tmRoot"/>
-      </p:par>
-    </p:tnLst>
-  </p:timing>
 </p:sld>
 </file>
 
@@ -8546,24 +8077,20 @@
           <a:p>
             <a:r>
               <a:rPr lang="en-US" sz="2800" dirty="0"/>
-              <a:t>To complete the previous example, use read() to get the content of a file that </a:t>
-            </a:r>
-            <a:r>
-              <a:rPr lang="en-US" sz="2800" dirty="0" smtClean="0"/>
-              <a:t>contains</a:t>
+              <a:t>To complete the previous example, use read() to get the content of a file that contains</a:t>
             </a:r>
           </a:p>
           <a:p>
             <a:endParaRPr lang="en-US" sz="2800" b="1" dirty="0"/>
           </a:p>
           <a:p>
-            <a:endParaRPr lang="en-US" sz="2800" b="1" dirty="0" smtClean="0"/>
-          </a:p>
-          <a:p>
             <a:endParaRPr lang="en-US" sz="2800" b="1" dirty="0"/>
           </a:p>
           <a:p>
-            <a:endParaRPr lang="en-US" sz="2800" b="1" dirty="0" smtClean="0"/>
+            <a:endParaRPr lang="en-US" sz="2800" b="1" dirty="0"/>
+          </a:p>
+          <a:p>
+            <a:endParaRPr lang="en-US" sz="2800" b="1" dirty="0"/>
           </a:p>
           <a:p>
             <a:r>
@@ -8604,7 +8131,7 @@
             <a:endParaRPr lang="en-US" sz="2800" b="1" dirty="0"/>
           </a:p>
           <a:p>
-            <a:endParaRPr lang="en-US" sz="2800" b="1" dirty="0" smtClean="0"/>
+            <a:endParaRPr lang="en-US" sz="2800" b="1" dirty="0"/>
           </a:p>
         </p:txBody>
       </p:sp>
@@ -8642,13 +8169,6 @@
   <p:clrMapOvr>
     <a:masterClrMapping/>
   </p:clrMapOvr>
-  <p:timing>
-    <p:tnLst>
-      <p:par>
-        <p:cTn id="1" dur="indefinite" restart="never" nodeType="tmRoot"/>
-      </p:par>
-    </p:tnLst>
-  </p:timing>
 </p:sld>
 </file>
 
@@ -8685,10 +8205,9 @@
           <a:lstStyle/>
           <a:p>
             <a:r>
-              <a:rPr lang="en-US" dirty="0" smtClean="0"/>
+              <a:rPr lang="en-US" dirty="0"/>
               <a:t>Motivation </a:t>
             </a:r>
-            <a:endParaRPr lang="en-US" dirty="0"/>
           </a:p>
         </p:txBody>
       </p:sp>
@@ -8716,12 +8235,8 @@
           <a:p>
             <a:pPr algn="just"/>
             <a:r>
-              <a:rPr lang="en-US" sz="2800" dirty="0" smtClean="0"/>
-              <a:t>We </a:t>
-            </a:r>
-            <a:r>
-              <a:rPr lang="en-US" sz="2800" dirty="0"/>
-              <a:t>looked at many programming languages like C, C++, Java, C#, </a:t>
+              <a:rPr lang="en-US" sz="2800" dirty="0"/>
+              <a:t>We looked at many programming languages like C, C++, Java, C#, </a:t>
             </a:r>
             <a:r>
               <a:rPr lang="en-US" sz="2800" dirty="0" err="1"/>
@@ -8729,40 +8244,20 @@
             </a:r>
             <a:r>
               <a:rPr lang="en-US" sz="2800" dirty="0"/>
-              <a:t>, PHP, Python &amp; Ruby</a:t>
-            </a:r>
-            <a:r>
-              <a:rPr lang="en-US" sz="2800" dirty="0" smtClean="0"/>
-              <a:t>.</a:t>
+              <a:t>, PHP, Python &amp; Ruby.</a:t>
             </a:r>
           </a:p>
           <a:p>
             <a:pPr marL="118872" indent="0" algn="just">
               <a:buNone/>
             </a:pPr>
-            <a:endParaRPr lang="en-US" sz="3000" dirty="0" smtClean="0"/>
+            <a:endParaRPr lang="en-US" sz="3000" dirty="0"/>
           </a:p>
           <a:p>
             <a:pPr algn="just"/>
             <a:r>
-              <a:rPr lang="en-US" sz="2800" dirty="0" smtClean="0"/>
-              <a:t>We </a:t>
-            </a:r>
-            <a:r>
-              <a:rPr lang="en-US" sz="2800" dirty="0"/>
-              <a:t>avoided using C or C++ directly because </a:t>
-            </a:r>
-            <a:r>
-              <a:rPr lang="en-US" sz="2800" dirty="0" smtClean="0"/>
-              <a:t>we </a:t>
-            </a:r>
-            <a:r>
-              <a:rPr lang="en-US" sz="2800" dirty="0"/>
-              <a:t>want high-level of productivity more than the level provided by these languages, also a language behind visual programming environment for novice programmers or professionals must be easy to use &amp; productive</a:t>
-            </a:r>
-            <a:r>
-              <a:rPr lang="en-US" sz="2800" dirty="0" smtClean="0"/>
-              <a:t>.</a:t>
+              <a:rPr lang="en-US" sz="2800" dirty="0"/>
+              <a:t>We avoided using C or C++ directly because we want high-level of productivity more than the level provided by these languages, also a language behind visual programming environment for novice programmers or professionals must be easy to use &amp; productive.</a:t>
             </a:r>
           </a:p>
         </p:txBody>
@@ -8777,13 +8272,6 @@
   <p:clrMapOvr>
     <a:masterClrMapping/>
   </p:clrMapOvr>
-  <p:timing>
-    <p:tnLst>
-      <p:par>
-        <p:cTn id="1" dur="indefinite" restart="never" nodeType="tmRoot"/>
-      </p:par>
-    </p:tnLst>
-  </p:timing>
 </p:sld>
 </file>
 
@@ -8851,7 +8339,7 @@
           <a:lstStyle/>
           <a:p>
             <a:r>
-              <a:rPr lang="en-US" sz="2800" dirty="0" smtClean="0"/>
+              <a:rPr lang="en-US" sz="2800" dirty="0"/>
               <a:t>Another Example</a:t>
             </a:r>
           </a:p>
@@ -8859,13 +8347,13 @@
             <a:pPr marL="118872" indent="0">
               <a:buNone/>
             </a:pPr>
-            <a:endParaRPr lang="en-US" sz="2800" dirty="0" smtClean="0"/>
+            <a:endParaRPr lang="en-US" sz="2800" dirty="0"/>
           </a:p>
           <a:p>
             <a:pPr marL="118872" indent="0">
               <a:buNone/>
             </a:pPr>
-            <a:endParaRPr lang="en-US" sz="2800" b="1" dirty="0" smtClean="0"/>
+            <a:endParaRPr lang="en-US" sz="2800" b="1" dirty="0"/>
           </a:p>
         </p:txBody>
       </p:sp>
@@ -8903,13 +8391,6 @@
   <p:clrMapOvr>
     <a:masterClrMapping/>
   </p:clrMapOvr>
-  <p:timing>
-    <p:tnLst>
-      <p:par>
-        <p:cTn id="1" dur="indefinite" restart="never" nodeType="tmRoot"/>
-      </p:par>
-    </p:tnLst>
-  </p:timing>
 </p:sld>
 </file>
 
@@ -8949,13 +8430,8 @@
           <a:p>
             <a:r>
               <a:rPr lang="en-US" b="0" dirty="0"/>
-              <a:t>Define Declarative Languages using Nested Structures based on </a:t>
-            </a:r>
-            <a:r>
-              <a:rPr lang="en-US" b="0" dirty="0" smtClean="0"/>
-              <a:t>OOP</a:t>
-            </a:r>
-            <a:endParaRPr lang="en-US" b="0" dirty="0"/>
+              <a:t>Define Declarative Languages using Nested Structures based on OOP</a:t>
+            </a:r>
           </a:p>
         </p:txBody>
       </p:sp>
@@ -8982,55 +8458,43 @@
           <a:lstStyle/>
           <a:p>
             <a:r>
-              <a:rPr lang="en-US" sz="2800" dirty="0" smtClean="0"/>
-              <a:t>The </a:t>
-            </a:r>
-            <a:r>
-              <a:rPr lang="en-US" sz="2800" dirty="0"/>
-              <a:t>next example from the Web library, generate HTML document using the Bootstrap library. No HTML code is written directly in this example, we created a similar language (just as example) Then using this declarative language that uses nested structures, we generated the HTML </a:t>
-            </a:r>
-            <a:r>
-              <a:rPr lang="en-US" sz="2800" dirty="0" smtClean="0"/>
-              <a:t>Document.</a:t>
-            </a:r>
-            <a:r>
-              <a:rPr lang="en-US" sz="2800" dirty="0"/>
-              <a:t> </a:t>
+              <a:rPr lang="en-US" sz="2800" dirty="0"/>
+              <a:t>The next example from the Web library, generate HTML document using the Bootstrap library. No HTML code is written directly in this example, we created a similar language (just as example) Then using this declarative language that uses nested structures, we generated the HTML Document. </a:t>
             </a:r>
             <a:br>
               <a:rPr lang="en-US" sz="2800" dirty="0"/>
             </a:br>
             <a:r>
-              <a:rPr lang="en-US" sz="2800" dirty="0" smtClean="0"/>
+              <a:rPr lang="en-US" sz="2800" dirty="0"/>
               <a:t>The idea in this example is that the </a:t>
             </a:r>
             <a:r>
-              <a:rPr lang="en-US" sz="2800" dirty="0" err="1" smtClean="0"/>
+              <a:rPr lang="en-US" sz="2800" dirty="0" err="1"/>
               <a:t>GetDiv</a:t>
             </a:r>
             <a:r>
-              <a:rPr lang="en-US" sz="2800" dirty="0" smtClean="0"/>
+              <a:rPr lang="en-US" sz="2800" dirty="0"/>
               <a:t>() and GetH1() methods return an object that we can access using {} and after each object access the method </a:t>
             </a:r>
             <a:r>
-              <a:rPr lang="en-US" sz="2800" dirty="0" err="1" smtClean="0"/>
+              <a:rPr lang="en-US" sz="2800" dirty="0" err="1"/>
               <a:t>BraceEnd</a:t>
             </a:r>
             <a:r>
-              <a:rPr lang="en-US" sz="2800" dirty="0" smtClean="0"/>
+              <a:rPr lang="en-US" sz="2800" dirty="0"/>
               <a:t>() will be executed to send the generated HTML to the parent object until we reach to the root where </a:t>
             </a:r>
             <a:r>
-              <a:rPr lang="en-US" sz="2800" dirty="0" err="1" smtClean="0"/>
+              <a:rPr lang="en-US" sz="2800" dirty="0" err="1"/>
               <a:t>BraceEnd</a:t>
             </a:r>
             <a:r>
-              <a:rPr lang="en-US" sz="2800" dirty="0" smtClean="0"/>
+              <a:rPr lang="en-US" sz="2800" dirty="0"/>
               <a:t>() will print the output.</a:t>
             </a:r>
           </a:p>
           <a:p>
-            <a:endParaRPr lang="en-US" sz="2800" b="1" dirty="0" smtClean="0"/>
+            <a:endParaRPr lang="en-US" sz="2800" b="1" dirty="0"/>
           </a:p>
         </p:txBody>
       </p:sp>
@@ -9044,13 +8508,6 @@
   <p:clrMapOvr>
     <a:masterClrMapping/>
   </p:clrMapOvr>
-  <p:timing>
-    <p:tnLst>
-      <p:par>
-        <p:cTn id="1" dur="indefinite" restart="never" nodeType="tmRoot"/>
-      </p:par>
-    </p:tnLst>
-  </p:timing>
 </p:sld>
 </file>
 
@@ -9090,13 +8547,8 @@
           <a:p>
             <a:r>
               <a:rPr lang="en-US" b="0" dirty="0"/>
-              <a:t>Define Declarative Languages using Nested Structures based on </a:t>
-            </a:r>
-            <a:r>
-              <a:rPr lang="en-US" b="0" dirty="0" smtClean="0"/>
-              <a:t>OOP</a:t>
-            </a:r>
-            <a:endParaRPr lang="en-US" b="0" dirty="0"/>
+              <a:t>Define Declarative Languages using Nested Structures based on OOP</a:t>
+            </a:r>
           </a:p>
         </p:txBody>
       </p:sp>
@@ -9136,13 +8588,6 @@
   <p:clrMapOvr>
     <a:masterClrMapping/>
   </p:clrMapOvr>
-  <p:timing>
-    <p:tnLst>
-      <p:par>
-        <p:cTn id="1" dur="indefinite" restart="never" nodeType="tmRoot"/>
-      </p:par>
-    </p:tnLst>
-  </p:timing>
 </p:sld>
 </file>
 
@@ -9182,13 +8627,8 @@
           <a:p>
             <a:r>
               <a:rPr lang="en-US" b="0" dirty="0"/>
-              <a:t>Define Declarative Languages using Nested Structures based on </a:t>
-            </a:r>
-            <a:r>
-              <a:rPr lang="en-US" b="0" dirty="0" smtClean="0"/>
-              <a:t>OOP</a:t>
-            </a:r>
-            <a:endParaRPr lang="en-US" b="0" dirty="0"/>
+              <a:t>Define Declarative Languages using Nested Structures based on OOP</a:t>
+            </a:r>
           </a:p>
         </p:txBody>
       </p:sp>
@@ -9216,18 +8656,14 @@
           <a:p>
             <a:r>
               <a:rPr lang="en-US" sz="2800" dirty="0"/>
-              <a:t>The classes that power the declarative interface looks like </a:t>
-            </a:r>
-            <a:r>
-              <a:rPr lang="en-US" sz="2800" dirty="0" smtClean="0"/>
-              <a:t>this</a:t>
+              <a:t>The classes that power the declarative interface looks like this</a:t>
             </a:r>
           </a:p>
           <a:p>
             <a:pPr marL="118872" indent="0">
               <a:buNone/>
             </a:pPr>
-            <a:endParaRPr lang="en-US" sz="2800" b="1" dirty="0" smtClean="0"/>
+            <a:endParaRPr lang="en-US" sz="2800" b="1" dirty="0"/>
           </a:p>
         </p:txBody>
       </p:sp>
@@ -9265,13 +8701,6 @@
   <p:clrMapOvr>
     <a:masterClrMapping/>
   </p:clrMapOvr>
-  <p:timing>
-    <p:tnLst>
-      <p:par>
-        <p:cTn id="1" dur="indefinite" restart="never" nodeType="tmRoot"/>
-      </p:par>
-    </p:tnLst>
-  </p:timing>
 </p:sld>
 </file>
 
@@ -9358,12 +8787,8 @@
           </a:p>
           <a:p>
             <a:r>
-              <a:rPr lang="en-US" sz="2800" dirty="0" smtClean="0"/>
-              <a:t>Memory </a:t>
-            </a:r>
-            <a:r>
-              <a:rPr lang="en-US" sz="2800" dirty="0"/>
-              <a:t>leaks</a:t>
+              <a:rPr lang="en-US" sz="2800" dirty="0"/>
+              <a:t>Memory leaks</a:t>
             </a:r>
           </a:p>
           <a:p>
@@ -9375,13 +8800,8 @@
           <a:p>
             <a:r>
               <a:rPr lang="en-US" sz="2800" dirty="0"/>
-              <a:t>Dangling </a:t>
-            </a:r>
-            <a:r>
-              <a:rPr lang="en-US" sz="2800" dirty="0" smtClean="0"/>
-              <a:t>pointer</a:t>
-            </a:r>
-            <a:endParaRPr lang="en-US" sz="2800" dirty="0"/>
+              <a:t>Dangling pointer</a:t>
+            </a:r>
           </a:p>
         </p:txBody>
       </p:sp>
@@ -9395,13 +8815,6 @@
   <p:clrMapOvr>
     <a:masterClrMapping/>
   </p:clrMapOvr>
-  <p:timing>
-    <p:tnLst>
-      <p:par>
-        <p:cTn id="1" dur="indefinite" restart="never" nodeType="tmRoot"/>
-      </p:par>
-    </p:tnLst>
-  </p:timing>
 </p:sld>
 </file>
 
@@ -9469,12 +8882,8 @@
           <a:lstStyle/>
           <a:p>
             <a:r>
-              <a:rPr lang="en-US" sz="2800" dirty="0" smtClean="0"/>
-              <a:t>Global </a:t>
-            </a:r>
-            <a:r>
-              <a:rPr lang="en-US" sz="2800" dirty="0"/>
-              <a:t>variables always stay in the memory, until you delete these variables using the assignment statement.</a:t>
+              <a:rPr lang="en-US" sz="2800" dirty="0"/>
+              <a:t>Global variables always stay in the memory, until you delete these variables using the assignment statement.</a:t>
             </a:r>
           </a:p>
           <a:p>
@@ -9486,11 +8895,7 @@
           <a:p>
             <a:r>
               <a:rPr lang="en-US" sz="2800" dirty="0"/>
-              <a:t>The programmer have full control on when to delete the variable from the memory using the Assignment statement</a:t>
-            </a:r>
-            <a:r>
-              <a:rPr lang="en-US" sz="2800" dirty="0" smtClean="0"/>
-              <a:t>.</a:t>
+              <a:t>The programmer have full control on when to delete the variable from the memory using the Assignment statement.</a:t>
             </a:r>
           </a:p>
           <a:p>
@@ -9509,26 +8914,9 @@
           </a:p>
           <a:p>
             <a:r>
-              <a:rPr lang="en-US" sz="2800" dirty="0" smtClean="0"/>
-              <a:t>if </a:t>
-            </a:r>
-            <a:r>
-              <a:rPr lang="en-US" sz="2800" dirty="0"/>
-              <a:t>we have a reference to a variable </a:t>
-            </a:r>
-            <a:r>
-              <a:rPr lang="en-US" sz="2800" dirty="0" smtClean="0"/>
-              <a:t>then </a:t>
-            </a:r>
-            <a:r>
-              <a:rPr lang="en-US" sz="2800" dirty="0"/>
-              <a:t>deleting variables will be based on reference </a:t>
-            </a:r>
-            <a:r>
-              <a:rPr lang="en-US" sz="2800" dirty="0" smtClean="0"/>
-              <a:t>counting.</a:t>
-            </a:r>
-            <a:endParaRPr lang="en-US" sz="2800" dirty="0"/>
+              <a:rPr lang="en-US" sz="2800" dirty="0"/>
+              <a:t>if we have a reference to a variable then deleting variables will be based on reference counting.</a:t>
+            </a:r>
           </a:p>
         </p:txBody>
       </p:sp>
@@ -9542,13 +8930,6 @@
   <p:clrMapOvr>
     <a:masterClrMapping/>
   </p:clrMapOvr>
-  <p:timing>
-    <p:tnLst>
-      <p:par>
-        <p:cTn id="1" dur="indefinite" restart="never" nodeType="tmRoot"/>
-      </p:par>
-    </p:tnLst>
-  </p:timing>
 </p:sld>
 </file>
 
@@ -9587,10 +8968,9 @@
           <a:lstStyle/>
           <a:p>
             <a:r>
-              <a:rPr lang="en-US" b="0" dirty="0" smtClean="0"/>
+              <a:rPr lang="en-US" b="0" dirty="0"/>
               <a:t>Syntax Flexibility </a:t>
             </a:r>
-            <a:endParaRPr lang="en-US" b="0" dirty="0"/>
           </a:p>
         </p:txBody>
       </p:sp>
@@ -9617,63 +8997,63 @@
           <a:lstStyle/>
           <a:p>
             <a:r>
-              <a:rPr lang="en-US" sz="2800" dirty="0" smtClean="0"/>
+              <a:rPr lang="en-US" sz="2800" dirty="0"/>
               <a:t>Change Language Keywords</a:t>
             </a:r>
           </a:p>
           <a:p>
             <a:r>
-              <a:rPr lang="en-US" sz="2800" dirty="0" smtClean="0"/>
+              <a:rPr lang="en-US" sz="2800" dirty="0"/>
               <a:t>Change Language Operators</a:t>
             </a:r>
           </a:p>
           <a:p>
             <a:r>
-              <a:rPr lang="en-US" sz="2800" dirty="0" smtClean="0"/>
+              <a:rPr lang="en-US" sz="2800" dirty="0"/>
               <a:t>Different Styles for </a:t>
             </a:r>
             <a:r>
-              <a:rPr lang="en-US" sz="2800" dirty="0" err="1" smtClean="0"/>
+              <a:rPr lang="en-US" sz="2800" dirty="0" err="1"/>
               <a:t>Input/Output</a:t>
             </a:r>
-            <a:endParaRPr lang="en-US" sz="2800" dirty="0" smtClean="0"/>
-          </a:p>
-          <a:p>
-            <a:r>
-              <a:rPr lang="en-US" sz="2800" dirty="0" smtClean="0"/>
+            <a:endParaRPr lang="en-US" sz="2800" dirty="0"/>
+          </a:p>
+          <a:p>
+            <a:r>
+              <a:rPr lang="en-US" sz="2800" dirty="0"/>
               <a:t>Different Styles for Control Structures</a:t>
             </a:r>
           </a:p>
           <a:p>
             <a:pPr lvl="1"/>
             <a:r>
-              <a:rPr lang="en-US" sz="2400" dirty="0" smtClean="0"/>
+              <a:rPr lang="en-US" sz="2400" dirty="0"/>
               <a:t>Using different keywords like the BASIC language</a:t>
             </a:r>
           </a:p>
           <a:p>
             <a:pPr lvl="1"/>
             <a:r>
-              <a:rPr lang="en-US" sz="2400" dirty="0" smtClean="0"/>
+              <a:rPr lang="en-US" sz="2400" dirty="0"/>
               <a:t>Using ‘end’ keyword like Pascal, </a:t>
             </a:r>
             <a:r>
-              <a:rPr lang="en-US" sz="2400" dirty="0" err="1" smtClean="0"/>
+              <a:rPr lang="en-US" sz="2400" dirty="0" err="1"/>
               <a:t>Lua</a:t>
             </a:r>
             <a:r>
-              <a:rPr lang="en-US" sz="2400" dirty="0" smtClean="0"/>
+              <a:rPr lang="en-US" sz="2400" dirty="0"/>
               <a:t> and Ruby</a:t>
             </a:r>
           </a:p>
           <a:p>
             <a:pPr lvl="1"/>
             <a:r>
-              <a:rPr lang="en-US" sz="2400" dirty="0" smtClean="0"/>
+              <a:rPr lang="en-US" sz="2400" dirty="0"/>
               <a:t>Using braces { } like C,C++, Java and C</a:t>
             </a:r>
             <a:r>
-              <a:rPr lang="en-US" sz="2400" smtClean="0"/>
+              <a:rPr lang="en-US" sz="2400"/>
               <a:t># languages</a:t>
             </a:r>
             <a:endParaRPr lang="en-US" sz="2400" dirty="0"/>
@@ -9690,13 +9070,6 @@
   <p:clrMapOvr>
     <a:masterClrMapping/>
   </p:clrMapOvr>
-  <p:timing>
-    <p:tnLst>
-      <p:par>
-        <p:cTn id="1" dur="indefinite" restart="never" nodeType="tmRoot"/>
-      </p:par>
-    </p:tnLst>
-  </p:timing>
 </p:sld>
 </file>
 
@@ -9735,10 +9108,9 @@
           <a:lstStyle/>
           <a:p>
             <a:r>
-              <a:rPr lang="en-US" b="0" dirty="0" smtClean="0"/>
+              <a:rPr lang="en-US" b="0" dirty="0"/>
               <a:t>Practical Demo</a:t>
             </a:r>
-            <a:endParaRPr lang="en-US" b="0" dirty="0"/>
           </a:p>
         </p:txBody>
       </p:sp>
@@ -9765,37 +9137,37 @@
           <a:lstStyle/>
           <a:p>
             <a:r>
-              <a:rPr lang="en-US" sz="2800" dirty="0" smtClean="0"/>
+              <a:rPr lang="en-US" sz="2800" dirty="0"/>
               <a:t>Using Ring Online</a:t>
             </a:r>
           </a:p>
           <a:p>
             <a:r>
-              <a:rPr lang="en-US" sz="2800" dirty="0" smtClean="0"/>
+              <a:rPr lang="en-US" sz="2800" dirty="0"/>
               <a:t>Documentation</a:t>
             </a:r>
           </a:p>
           <a:p>
             <a:r>
-              <a:rPr lang="en-US" sz="2800" dirty="0" smtClean="0"/>
+              <a:rPr lang="en-US" sz="2800" dirty="0"/>
               <a:t>Source Code (GitHub)</a:t>
             </a:r>
           </a:p>
           <a:p>
             <a:r>
-              <a:rPr lang="en-US" sz="2800" dirty="0" smtClean="0"/>
+              <a:rPr lang="en-US" sz="2800" dirty="0"/>
               <a:t>Ring Notepad</a:t>
             </a:r>
           </a:p>
           <a:p>
             <a:r>
-              <a:rPr lang="en-US" sz="2800" dirty="0" smtClean="0"/>
+              <a:rPr lang="en-US" sz="2800" dirty="0"/>
               <a:t>Games and Apps</a:t>
             </a:r>
           </a:p>
           <a:p>
             <a:r>
-              <a:rPr lang="en-US" sz="2800" dirty="0" smtClean="0"/>
+              <a:rPr lang="en-US" sz="2800" dirty="0"/>
               <a:t>Web Development Demo</a:t>
             </a:r>
             <a:endParaRPr lang="en-US" sz="2400" dirty="0"/>
@@ -9812,13 +9184,6 @@
   <p:clrMapOvr>
     <a:masterClrMapping/>
   </p:clrMapOvr>
-  <p:timing>
-    <p:tnLst>
-      <p:par>
-        <p:cTn id="1" dur="indefinite" restart="never" nodeType="tmRoot"/>
-      </p:par>
-    </p:tnLst>
-  </p:timing>
 </p:sld>
 </file>
 
@@ -9855,10 +9220,9 @@
           <a:lstStyle/>
           <a:p>
             <a:r>
-              <a:rPr lang="en-US" dirty="0" smtClean="0"/>
+              <a:rPr lang="en-US" dirty="0"/>
               <a:t>Motivation </a:t>
             </a:r>
-            <a:endParaRPr lang="en-US" dirty="0"/>
           </a:p>
         </p:txBody>
       </p:sp>
@@ -9887,41 +9251,8 @@
             <a:pPr algn="just"/>
             <a:r>
               <a:rPr lang="en-US" sz="2800" dirty="0"/>
-              <a:t>Java &amp; C# are avoided for some reason too! </a:t>
-            </a:r>
-            <a:r>
-              <a:rPr lang="en-US" sz="2800" dirty="0" smtClean="0"/>
-              <a:t>We </a:t>
-            </a:r>
-            <a:r>
-              <a:rPr lang="en-US" sz="2800" dirty="0"/>
-              <a:t>wanted to use a dynamic programming language and these languages are static typing, Java is multi-platform, also C# through Mono, but the use of huge number of classes and forcing the use of Object-Orientation, using a verbose language is not right for </a:t>
-            </a:r>
-            <a:r>
-              <a:rPr lang="en-US" sz="2800" dirty="0" smtClean="0"/>
-              <a:t>us. We </a:t>
-            </a:r>
-            <a:r>
-              <a:rPr lang="en-US" sz="2800" dirty="0"/>
-              <a:t>need a small language, but fast and productive, also </a:t>
-            </a:r>
-            <a:r>
-              <a:rPr lang="en-US" sz="2800" dirty="0" smtClean="0"/>
-              <a:t>We </a:t>
-            </a:r>
-            <a:r>
-              <a:rPr lang="en-US" sz="2800" dirty="0"/>
-              <a:t>need better control on the Garbage Collector (GC), </a:t>
-            </a:r>
-            <a:r>
-              <a:rPr lang="en-US" sz="2800" dirty="0" smtClean="0"/>
-              <a:t>We </a:t>
-            </a:r>
-            <a:r>
-              <a:rPr lang="en-US" sz="2800" dirty="0"/>
-              <a:t>need a better one that is designed for fast applications.</a:t>
-            </a:r>
-            <a:endParaRPr lang="en-US" sz="2800" dirty="0" smtClean="0"/>
+              <a:t>Java &amp; C# are avoided for some reason too! We wanted to use a dynamic programming language and these languages are static typing, Java is multi-platform, also C# through Mono, but the use of huge number of classes and forcing the use of Object-Orientation, using a verbose language is not right for us. We need a small language, but fast and productive, also We need better control on the Garbage Collector (GC), We need a better one that is designed for fast applications.</a:t>
+            </a:r>
           </a:p>
         </p:txBody>
       </p:sp>
@@ -9935,13 +9266,6 @@
   <p:clrMapOvr>
     <a:masterClrMapping/>
   </p:clrMapOvr>
-  <p:timing>
-    <p:tnLst>
-      <p:par>
-        <p:cTn id="1" dur="indefinite" restart="never" nodeType="tmRoot"/>
-      </p:par>
-    </p:tnLst>
-  </p:timing>
 </p:sld>
 </file>
 
@@ -9978,10 +9302,9 @@
           <a:lstStyle/>
           <a:p>
             <a:r>
-              <a:rPr lang="en-US" dirty="0" smtClean="0"/>
+              <a:rPr lang="en-US" dirty="0"/>
               <a:t>Motivation </a:t>
             </a:r>
-            <a:endParaRPr lang="en-US" dirty="0"/>
           </a:p>
         </p:txBody>
       </p:sp>
@@ -10014,50 +9337,7 @@
             </a:r>
             <a:r>
               <a:rPr lang="en-US" sz="2800" dirty="0"/>
-              <a:t> is small and fast, but it’s avoided because </a:t>
-            </a:r>
-            <a:r>
-              <a:rPr lang="en-US" sz="2800" dirty="0" smtClean="0"/>
-              <a:t>we </a:t>
-            </a:r>
-            <a:r>
-              <a:rPr lang="en-US" sz="2800" dirty="0"/>
-              <a:t>need more powerful language for large applications</a:t>
-            </a:r>
-            <a:r>
-              <a:rPr lang="en-US" sz="2800" dirty="0" smtClean="0"/>
-              <a:t>.</a:t>
-            </a:r>
-          </a:p>
-          <a:p>
-            <a:pPr algn="just"/>
-            <a:endParaRPr lang="en-US" sz="2800" dirty="0" smtClean="0"/>
-          </a:p>
-          <a:p>
-            <a:pPr algn="just"/>
-            <a:r>
-              <a:rPr lang="en-US" sz="2800" dirty="0"/>
-              <a:t>PHP is a Web programming language and it’s syntax is very similar to C, this leads to a language not general as </a:t>
-            </a:r>
-            <a:r>
-              <a:rPr lang="en-US" sz="2800" dirty="0" smtClean="0"/>
-              <a:t>we </a:t>
-            </a:r>
-            <a:r>
-              <a:rPr lang="en-US" sz="2800" dirty="0"/>
-              <a:t>want and not simple as </a:t>
-            </a:r>
-            <a:r>
-              <a:rPr lang="en-US" sz="2800" dirty="0" smtClean="0"/>
-              <a:t>we </a:t>
-            </a:r>
-            <a:r>
-              <a:rPr lang="en-US" sz="2800" dirty="0"/>
-              <a:t>need to have</a:t>
-            </a:r>
-            <a:r>
-              <a:rPr lang="en-US" sz="2800" dirty="0" smtClean="0"/>
-              <a:t>.</a:t>
+              <a:t> is small and fast, but it’s avoided because we need more powerful language for large applications.</a:t>
             </a:r>
           </a:p>
           <a:p>
@@ -10068,25 +9348,19 @@
             <a:pPr algn="just"/>
             <a:r>
               <a:rPr lang="en-US" sz="2800" dirty="0"/>
-              <a:t>Python &amp; Ruby are more like what </a:t>
-            </a:r>
-            <a:r>
-              <a:rPr lang="en-US" sz="2800" dirty="0" smtClean="0"/>
-              <a:t>we </a:t>
-            </a:r>
-            <a:r>
-              <a:rPr lang="en-US" sz="2800" dirty="0"/>
-              <a:t>need, but </a:t>
-            </a:r>
-            <a:r>
-              <a:rPr lang="en-US" sz="2800" dirty="0" smtClean="0"/>
-              <a:t>we </a:t>
-            </a:r>
-            <a:r>
-              <a:rPr lang="en-US" sz="2800" dirty="0"/>
-              <a:t>need something more simple, smaller, faster &amp; productive.</a:t>
-            </a:r>
-            <a:endParaRPr lang="en-US" sz="2800" dirty="0" smtClean="0"/>
+              <a:t>PHP is a Web programming language and it’s syntax is very similar to C, this leads to a language not general as we want and not simple as we need to have.</a:t>
+            </a:r>
+          </a:p>
+          <a:p>
+            <a:pPr algn="just"/>
+            <a:endParaRPr lang="en-US" sz="2800" dirty="0"/>
+          </a:p>
+          <a:p>
+            <a:pPr algn="just"/>
+            <a:r>
+              <a:rPr lang="en-US" sz="2800" dirty="0"/>
+              <a:t>Python &amp; Ruby are more like what we need, but we need something more simple, smaller, faster &amp; productive.</a:t>
+            </a:r>
           </a:p>
         </p:txBody>
       </p:sp>
@@ -10100,13 +9374,6 @@
   <p:clrMapOvr>
     <a:masterClrMapping/>
   </p:clrMapOvr>
-  <p:timing>
-    <p:tnLst>
-      <p:par>
-        <p:cTn id="1" dur="indefinite" restart="never" nodeType="tmRoot"/>
-      </p:par>
-    </p:tnLst>
-  </p:timing>
 </p:sld>
 </file>
 
@@ -10143,10 +9410,9 @@
           <a:lstStyle/>
           <a:p>
             <a:r>
-              <a:rPr lang="en-US" dirty="0" smtClean="0"/>
+              <a:rPr lang="en-US" dirty="0"/>
               <a:t>Motivation </a:t>
             </a:r>
-            <a:endParaRPr lang="en-US" dirty="0"/>
           </a:p>
         </p:txBody>
       </p:sp>
@@ -10175,27 +9441,7 @@
             <a:pPr algn="just"/>
             <a:r>
               <a:rPr lang="en-US" sz="2800" dirty="0"/>
-              <a:t>Python and Ruby are Case-Sensitive, the list index start counting from </a:t>
-            </a:r>
-            <a:r>
-              <a:rPr lang="en-US" sz="2800" dirty="0" smtClean="0"/>
-              <a:t>0, </a:t>
-            </a:r>
-            <a:r>
-              <a:rPr lang="en-US" sz="2800" dirty="0"/>
-              <a:t>you have to define the function before calling it, Ruby usage of Object-Orientation and message passing is more than what </a:t>
-            </a:r>
-            <a:r>
-              <a:rPr lang="en-US" sz="2800" dirty="0" smtClean="0"/>
-              <a:t>we </a:t>
-            </a:r>
-            <a:r>
-              <a:rPr lang="en-US" sz="2800" dirty="0"/>
-              <a:t>need and decrease performance, Python syntax (indentation, using self, :, pass &amp; _) is not good for </a:t>
-            </a:r>
-            <a:r>
-              <a:rPr lang="en-US" sz="2800" dirty="0" smtClean="0"/>
-              <a:t>our goals.</a:t>
+              <a:t>Python and Ruby are Case-Sensitive, the list index start counting from 0, you have to define the function before calling it, Ruby usage of Object-Orientation and message passing is more than what we need and decrease performance, Python syntax (indentation, using self, :, pass &amp; _) is not good for our goals.</a:t>
             </a:r>
           </a:p>
           <a:p>
@@ -10216,13 +9462,6 @@
   <p:clrMapOvr>
     <a:masterClrMapping/>
   </p:clrMapOvr>
-  <p:timing>
-    <p:tnLst>
-      <p:par>
-        <p:cTn id="1" dur="indefinite" restart="never" nodeType="tmRoot"/>
-      </p:par>
-    </p:tnLst>
-  </p:timing>
 </p:sld>
 </file>
 
@@ -10259,10 +9498,9 @@
           <a:lstStyle/>
           <a:p>
             <a:r>
-              <a:rPr lang="en-US" dirty="0" smtClean="0"/>
+              <a:rPr lang="en-US" dirty="0"/>
               <a:t>Motivation </a:t>
             </a:r>
-            <a:endParaRPr lang="en-US" dirty="0"/>
           </a:p>
         </p:txBody>
       </p:sp>
@@ -10291,23 +9529,7 @@
             <a:pPr algn="just"/>
             <a:r>
               <a:rPr lang="en-US" sz="2800" dirty="0"/>
-              <a:t>All of these languages are successful languages, and very good for their domains, but </a:t>
-            </a:r>
-            <a:r>
-              <a:rPr lang="en-US" sz="2800" dirty="0" smtClean="0"/>
-              <a:t>what we need </a:t>
-            </a:r>
-            <a:r>
-              <a:rPr lang="en-US" sz="2800" dirty="0"/>
-              <a:t>is a different language that comes with new ideas and intelligent implementation (Innovative, Ready, Simple, Small, </a:t>
-            </a:r>
-            <a:r>
-              <a:rPr lang="en-US" sz="2800" dirty="0" smtClean="0"/>
-              <a:t>Flexible </a:t>
-            </a:r>
-            <a:r>
-              <a:rPr lang="en-US" sz="2800" dirty="0"/>
-              <a:t>and Fast).</a:t>
+              <a:t>All of these languages are successful languages, and very good for their domains, but what we need is a different language that comes with new ideas and intelligent implementation (Innovative, Ready, Simple, Small, Flexible and Fast).</a:t>
             </a:r>
           </a:p>
         </p:txBody>
@@ -10322,13 +9544,6 @@
   <p:clrMapOvr>
     <a:masterClrMapping/>
   </p:clrMapOvr>
-  <p:timing>
-    <p:tnLst>
-      <p:par>
-        <p:cTn id="1" dur="indefinite" restart="never" nodeType="tmRoot"/>
-      </p:par>
-    </p:tnLst>
-  </p:timing>
 </p:sld>
 </file>
 
@@ -10365,10 +9580,9 @@
           <a:lstStyle/>
           <a:p>
             <a:r>
-              <a:rPr lang="en-US" dirty="0" smtClean="0"/>
+              <a:rPr lang="en-US" dirty="0"/>
               <a:t>Features </a:t>
             </a:r>
-            <a:endParaRPr lang="en-US" dirty="0"/>
           </a:p>
         </p:txBody>
       </p:sp>
@@ -10396,50 +9610,50 @@
           <a:p>
             <a:pPr algn="just"/>
             <a:r>
-              <a:rPr lang="en-US" sz="2800" dirty="0" smtClean="0"/>
+              <a:rPr lang="en-US" sz="2800" dirty="0"/>
               <a:t>Free Open Source (MIT License)</a:t>
             </a:r>
           </a:p>
           <a:p>
             <a:pPr algn="just"/>
             <a:r>
-              <a:rPr lang="en-US" sz="2800" dirty="0" smtClean="0"/>
+              <a:rPr lang="en-US" sz="2800" dirty="0"/>
               <a:t>Written in ANSI C</a:t>
             </a:r>
           </a:p>
           <a:p>
             <a:pPr algn="just"/>
             <a:r>
-              <a:rPr lang="en-US" sz="2800" dirty="0" smtClean="0"/>
+              <a:rPr lang="en-US" sz="2800" dirty="0"/>
               <a:t>Simple, Small, Flexible and Fast.</a:t>
             </a:r>
           </a:p>
           <a:p>
             <a:pPr algn="just"/>
             <a:r>
-              <a:rPr lang="en-US" sz="2800" dirty="0" smtClean="0"/>
+              <a:rPr lang="en-US" sz="2800" dirty="0"/>
               <a:t>Portable (Windows, Linux, Mac OS X, Android, </a:t>
             </a:r>
             <a:r>
-              <a:rPr lang="en-US" sz="2800" dirty="0" err="1" smtClean="0"/>
+              <a:rPr lang="en-US" sz="2800" dirty="0" err="1"/>
               <a:t>etc</a:t>
             </a:r>
             <a:r>
-              <a:rPr lang="en-US" sz="2800" dirty="0" smtClean="0"/>
+              <a:rPr lang="en-US" sz="2800" dirty="0"/>
               <a:t>)</a:t>
             </a:r>
           </a:p>
           <a:p>
             <a:pPr algn="just"/>
             <a:r>
-              <a:rPr lang="en-US" sz="2800" dirty="0" smtClean="0"/>
+              <a:rPr lang="en-US" sz="2800" dirty="0"/>
               <a:t>Can be used for Desktop, Web, Mobile and Games development.</a:t>
             </a:r>
           </a:p>
           <a:p>
             <a:pPr algn="just"/>
             <a:r>
-              <a:rPr lang="en-US" sz="2800" dirty="0" smtClean="0"/>
+              <a:rPr lang="en-US" sz="2800" dirty="0"/>
               <a:t>Multi-Paradigm (Imperative, Procedural, Object-Oriented, Functional, Declarative and Natural).</a:t>
             </a:r>
           </a:p>
@@ -10447,33 +9661,29 @@
             <a:pPr algn="just"/>
             <a:r>
               <a:rPr lang="en-US" sz="2800" dirty="0"/>
-              <a:t>Successor to the Supernova programming </a:t>
-            </a:r>
-            <a:r>
-              <a:rPr lang="en-US" sz="2800" dirty="0" smtClean="0"/>
-              <a:t>language</a:t>
+              <a:t>Successor to the Supernova programming language</a:t>
             </a:r>
           </a:p>
           <a:p>
             <a:pPr algn="just"/>
             <a:r>
-              <a:rPr lang="en-US" sz="2800" dirty="0" smtClean="0"/>
+              <a:rPr lang="en-US" sz="2800" dirty="0"/>
               <a:t>Learn a lot from other languages like C,C++, Java, C#, Lisp, Smalltalk, </a:t>
             </a:r>
             <a:r>
-              <a:rPr lang="en-US" sz="2800" dirty="0" err="1" smtClean="0"/>
+              <a:rPr lang="en-US" sz="2800" dirty="0" err="1"/>
               <a:t>Lua</a:t>
             </a:r>
             <a:r>
-              <a:rPr lang="en-US" sz="2800" dirty="0" smtClean="0"/>
+              <a:rPr lang="en-US" sz="2800" dirty="0"/>
               <a:t>, PHP, Python, Ruby, </a:t>
             </a:r>
             <a:r>
-              <a:rPr lang="en-US" sz="2800" dirty="0" err="1" smtClean="0"/>
+              <a:rPr lang="en-US" sz="2800" dirty="0" err="1"/>
               <a:t>Harbour</a:t>
             </a:r>
             <a:r>
-              <a:rPr lang="en-US" sz="2800" dirty="0" smtClean="0"/>
+              <a:rPr lang="en-US" sz="2800" dirty="0"/>
               <a:t>, Visual FoxPro, QML and REBOL.</a:t>
             </a:r>
           </a:p>
@@ -10489,13 +9699,6 @@
   <p:clrMapOvr>
     <a:masterClrMapping/>
   </p:clrMapOvr>
-  <p:timing>
-    <p:tnLst>
-      <p:par>
-        <p:cTn id="1" dur="indefinite" restart="never" nodeType="tmRoot"/>
-      </p:par>
-    </p:tnLst>
-  </p:timing>
 </p:sld>
 </file>
 

</xml_diff>